<commit_message>
added some notes for my slides
</commit_message>
<xml_diff>
--- a/HTML 5.pptx
+++ b/HTML 5.pptx
@@ -5,7 +5,7 @@
     <p:sldMasterId id="2147483672" r:id="rId1"/>
   </p:sldMasterIdLst>
   <p:notesMasterIdLst>
-    <p:notesMasterId r:id="rId15"/>
+    <p:notesMasterId r:id="rId16"/>
   </p:notesMasterIdLst>
   <p:sldIdLst>
     <p:sldId id="256" r:id="rId2"/>
@@ -21,6 +21,7 @@
     <p:sldId id="263" r:id="rId12"/>
     <p:sldId id="264" r:id="rId13"/>
     <p:sldId id="265" r:id="rId14"/>
+    <p:sldId id="269" r:id="rId15"/>
   </p:sldIdLst>
   <p:sldSz cx="9144000" cy="6858000" type="screen4x3"/>
   <p:notesSz cx="6858000" cy="9144000"/>
@@ -555,6 +556,676 @@
     <p:extLst>
       <p:ext uri="{BB962C8B-B14F-4D97-AF65-F5344CB8AC3E}">
         <p14:creationId xmlns:p14="http://schemas.microsoft.com/office/powerpoint/2010/main" val="1708360401"/>
+      </p:ext>
+    </p:extLst>
+  </p:cSld>
+  <p:clrMapOvr>
+    <a:masterClrMapping/>
+  </p:clrMapOvr>
+</p:notes>
+</file>
+
+<file path=ppt/notesSlides/notesSlide2.xml><?xml version="1.0" encoding="utf-8"?>
+<p:notes xmlns:a="http://schemas.openxmlformats.org/drawingml/2006/main" xmlns:r="http://schemas.openxmlformats.org/officeDocument/2006/relationships" xmlns:p="http://schemas.openxmlformats.org/presentationml/2006/main">
+  <p:cSld>
+    <p:spTree>
+      <p:nvGrpSpPr>
+        <p:cNvPr id="1" name=""/>
+        <p:cNvGrpSpPr/>
+        <p:nvPr/>
+      </p:nvGrpSpPr>
+      <p:grpSpPr>
+        <a:xfrm>
+          <a:off x="0" y="0"/>
+          <a:ext cx="0" cy="0"/>
+          <a:chOff x="0" y="0"/>
+          <a:chExt cx="0" cy="0"/>
+        </a:xfrm>
+      </p:grpSpPr>
+      <p:sp>
+        <p:nvSpPr>
+          <p:cNvPr id="2" name="Slide Image Placeholder 1"/>
+          <p:cNvSpPr>
+            <a:spLocks noGrp="1" noRot="1" noChangeAspect="1"/>
+          </p:cNvSpPr>
+          <p:nvPr>
+            <p:ph type="sldImg"/>
+          </p:nvPr>
+        </p:nvSpPr>
+        <p:spPr/>
+      </p:sp>
+      <p:sp>
+        <p:nvSpPr>
+          <p:cNvPr id="3" name="Notes Placeholder 2"/>
+          <p:cNvSpPr>
+            <a:spLocks noGrp="1"/>
+          </p:cNvSpPr>
+          <p:nvPr>
+            <p:ph type="body" idx="1"/>
+          </p:nvPr>
+        </p:nvSpPr>
+        <p:spPr/>
+        <p:txBody>
+          <a:bodyPr/>
+          <a:lstStyle/>
+          <a:p>
+            <a:r>
+              <a:rPr lang="en-US" dirty="0" smtClean="0"/>
+              <a:t>Can obviously see that IE is lacking, this is a theme for the next 5 slides.  IE 9 does</a:t>
+            </a:r>
+            <a:r>
+              <a:rPr lang="en-US" baseline="0" dirty="0" smtClean="0"/>
+              <a:t> become more “useable,” but is still lacking compared to other browsers.</a:t>
+            </a:r>
+          </a:p>
+          <a:p>
+            <a:r>
+              <a:rPr lang="en-US" baseline="0" dirty="0" smtClean="0"/>
+              <a:t>Best: Chrome 5, 6 and Safari 5  on both mac and windows</a:t>
+            </a:r>
+            <a:endParaRPr lang="en-US" dirty="0"/>
+          </a:p>
+        </p:txBody>
+      </p:sp>
+      <p:sp>
+        <p:nvSpPr>
+          <p:cNvPr id="4" name="Slide Number Placeholder 3"/>
+          <p:cNvSpPr>
+            <a:spLocks noGrp="1"/>
+          </p:cNvSpPr>
+          <p:nvPr>
+            <p:ph type="sldNum" sz="quarter" idx="10"/>
+          </p:nvPr>
+        </p:nvSpPr>
+        <p:spPr/>
+        <p:txBody>
+          <a:bodyPr/>
+          <a:lstStyle/>
+          <a:p>
+            <a:fld id="{BDB1CA01-44E6-4955-881A-F7B7682CC8B6}" type="slidenum">
+              <a:rPr lang="en-US" smtClean="0"/>
+              <a:t>8</a:t>
+            </a:fld>
+            <a:endParaRPr lang="en-US"/>
+          </a:p>
+        </p:txBody>
+      </p:sp>
+    </p:spTree>
+    <p:extLst>
+      <p:ext uri="{BB962C8B-B14F-4D97-AF65-F5344CB8AC3E}">
+        <p14:creationId xmlns:p14="http://schemas.microsoft.com/office/powerpoint/2010/main" val="2088620080"/>
+      </p:ext>
+    </p:extLst>
+  </p:cSld>
+  <p:clrMapOvr>
+    <a:masterClrMapping/>
+  </p:clrMapOvr>
+</p:notes>
+</file>
+
+<file path=ppt/notesSlides/notesSlide3.xml><?xml version="1.0" encoding="utf-8"?>
+<p:notes xmlns:a="http://schemas.openxmlformats.org/drawingml/2006/main" xmlns:r="http://schemas.openxmlformats.org/officeDocument/2006/relationships" xmlns:p="http://schemas.openxmlformats.org/presentationml/2006/main">
+  <p:cSld>
+    <p:spTree>
+      <p:nvGrpSpPr>
+        <p:cNvPr id="1" name=""/>
+        <p:cNvGrpSpPr/>
+        <p:nvPr/>
+      </p:nvGrpSpPr>
+      <p:grpSpPr>
+        <a:xfrm>
+          <a:off x="0" y="0"/>
+          <a:ext cx="0" cy="0"/>
+          <a:chOff x="0" y="0"/>
+          <a:chExt cx="0" cy="0"/>
+        </a:xfrm>
+      </p:grpSpPr>
+      <p:sp>
+        <p:nvSpPr>
+          <p:cNvPr id="2" name="Slide Image Placeholder 1"/>
+          <p:cNvSpPr>
+            <a:spLocks noGrp="1" noRot="1" noChangeAspect="1"/>
+          </p:cNvSpPr>
+          <p:nvPr>
+            <p:ph type="sldImg"/>
+          </p:nvPr>
+        </p:nvSpPr>
+        <p:spPr/>
+      </p:sp>
+      <p:sp>
+        <p:nvSpPr>
+          <p:cNvPr id="3" name="Notes Placeholder 2"/>
+          <p:cNvSpPr>
+            <a:spLocks noGrp="1"/>
+          </p:cNvSpPr>
+          <p:nvPr>
+            <p:ph type="body" idx="1"/>
+          </p:nvPr>
+        </p:nvSpPr>
+        <p:spPr/>
+        <p:txBody>
+          <a:bodyPr/>
+          <a:lstStyle/>
+          <a:p>
+            <a:r>
+              <a:rPr lang="en-US" dirty="0" smtClean="0"/>
+              <a:t>Pretty much anything but</a:t>
+            </a:r>
+            <a:r>
+              <a:rPr lang="en-US" baseline="0" dirty="0" smtClean="0"/>
+              <a:t> IE 8 and less…</a:t>
+            </a:r>
+            <a:endParaRPr lang="en-US" dirty="0"/>
+          </a:p>
+        </p:txBody>
+      </p:sp>
+      <p:sp>
+        <p:nvSpPr>
+          <p:cNvPr id="4" name="Slide Number Placeholder 3"/>
+          <p:cNvSpPr>
+            <a:spLocks noGrp="1"/>
+          </p:cNvSpPr>
+          <p:nvPr>
+            <p:ph type="sldNum" sz="quarter" idx="10"/>
+          </p:nvPr>
+        </p:nvSpPr>
+        <p:spPr/>
+        <p:txBody>
+          <a:bodyPr/>
+          <a:lstStyle/>
+          <a:p>
+            <a:fld id="{BDB1CA01-44E6-4955-881A-F7B7682CC8B6}" type="slidenum">
+              <a:rPr lang="en-US" smtClean="0"/>
+              <a:t>9</a:t>
+            </a:fld>
+            <a:endParaRPr lang="en-US"/>
+          </a:p>
+        </p:txBody>
+      </p:sp>
+    </p:spTree>
+    <p:extLst>
+      <p:ext uri="{BB962C8B-B14F-4D97-AF65-F5344CB8AC3E}">
+        <p14:creationId xmlns:p14="http://schemas.microsoft.com/office/powerpoint/2010/main" val="3968686592"/>
+      </p:ext>
+    </p:extLst>
+  </p:cSld>
+  <p:clrMapOvr>
+    <a:masterClrMapping/>
+  </p:clrMapOvr>
+</p:notes>
+</file>
+
+<file path=ppt/notesSlides/notesSlide4.xml><?xml version="1.0" encoding="utf-8"?>
+<p:notes xmlns:a="http://schemas.openxmlformats.org/drawingml/2006/main" xmlns:r="http://schemas.openxmlformats.org/officeDocument/2006/relationships" xmlns:p="http://schemas.openxmlformats.org/presentationml/2006/main">
+  <p:cSld>
+    <p:spTree>
+      <p:nvGrpSpPr>
+        <p:cNvPr id="1" name=""/>
+        <p:cNvGrpSpPr/>
+        <p:nvPr/>
+      </p:nvGrpSpPr>
+      <p:grpSpPr>
+        <a:xfrm>
+          <a:off x="0" y="0"/>
+          <a:ext cx="0" cy="0"/>
+          <a:chOff x="0" y="0"/>
+          <a:chExt cx="0" cy="0"/>
+        </a:xfrm>
+      </p:grpSpPr>
+      <p:sp>
+        <p:nvSpPr>
+          <p:cNvPr id="2" name="Slide Image Placeholder 1"/>
+          <p:cNvSpPr>
+            <a:spLocks noGrp="1" noRot="1" noChangeAspect="1"/>
+          </p:cNvSpPr>
+          <p:nvPr>
+            <p:ph type="sldImg"/>
+          </p:nvPr>
+        </p:nvSpPr>
+        <p:spPr/>
+      </p:sp>
+      <p:sp>
+        <p:nvSpPr>
+          <p:cNvPr id="3" name="Notes Placeholder 2"/>
+          <p:cNvSpPr>
+            <a:spLocks noGrp="1"/>
+          </p:cNvSpPr>
+          <p:nvPr>
+            <p:ph type="body" idx="1"/>
+          </p:nvPr>
+        </p:nvSpPr>
+        <p:spPr/>
+        <p:txBody>
+          <a:bodyPr/>
+          <a:lstStyle/>
+          <a:p>
+            <a:r>
+              <a:rPr lang="en-US" dirty="0" smtClean="0"/>
+              <a:t>Again Chrome and Safari tie</a:t>
+            </a:r>
+            <a:r>
+              <a:rPr lang="en-US" baseline="0" dirty="0" smtClean="0"/>
+              <a:t> for most compatible, but safari supports wav instead of </a:t>
+            </a:r>
+            <a:r>
+              <a:rPr lang="en-US" baseline="0" dirty="0" err="1" smtClean="0"/>
+              <a:t>ogg</a:t>
+            </a:r>
+            <a:r>
+              <a:rPr lang="en-US" baseline="0" dirty="0" smtClean="0"/>
+              <a:t> while chrome is opposite.</a:t>
+            </a:r>
+            <a:endParaRPr lang="en-US" dirty="0"/>
+          </a:p>
+        </p:txBody>
+      </p:sp>
+      <p:sp>
+        <p:nvSpPr>
+          <p:cNvPr id="4" name="Slide Number Placeholder 3"/>
+          <p:cNvSpPr>
+            <a:spLocks noGrp="1"/>
+          </p:cNvSpPr>
+          <p:nvPr>
+            <p:ph type="sldNum" sz="quarter" idx="10"/>
+          </p:nvPr>
+        </p:nvSpPr>
+        <p:spPr/>
+        <p:txBody>
+          <a:bodyPr/>
+          <a:lstStyle/>
+          <a:p>
+            <a:fld id="{BDB1CA01-44E6-4955-881A-F7B7682CC8B6}" type="slidenum">
+              <a:rPr lang="en-US" smtClean="0"/>
+              <a:t>10</a:t>
+            </a:fld>
+            <a:endParaRPr lang="en-US"/>
+          </a:p>
+        </p:txBody>
+      </p:sp>
+    </p:spTree>
+    <p:extLst>
+      <p:ext uri="{BB962C8B-B14F-4D97-AF65-F5344CB8AC3E}">
+        <p14:creationId xmlns:p14="http://schemas.microsoft.com/office/powerpoint/2010/main" val="837441399"/>
+      </p:ext>
+    </p:extLst>
+  </p:cSld>
+  <p:clrMapOvr>
+    <a:masterClrMapping/>
+  </p:clrMapOvr>
+</p:notes>
+</file>
+
+<file path=ppt/notesSlides/notesSlide5.xml><?xml version="1.0" encoding="utf-8"?>
+<p:notes xmlns:a="http://schemas.openxmlformats.org/drawingml/2006/main" xmlns:r="http://schemas.openxmlformats.org/officeDocument/2006/relationships" xmlns:p="http://schemas.openxmlformats.org/presentationml/2006/main">
+  <p:cSld>
+    <p:spTree>
+      <p:nvGrpSpPr>
+        <p:cNvPr id="1" name=""/>
+        <p:cNvGrpSpPr/>
+        <p:nvPr/>
+      </p:nvGrpSpPr>
+      <p:grpSpPr>
+        <a:xfrm>
+          <a:off x="0" y="0"/>
+          <a:ext cx="0" cy="0"/>
+          <a:chOff x="0" y="0"/>
+          <a:chExt cx="0" cy="0"/>
+        </a:xfrm>
+      </p:grpSpPr>
+      <p:sp>
+        <p:nvSpPr>
+          <p:cNvPr id="2" name="Slide Image Placeholder 1"/>
+          <p:cNvSpPr>
+            <a:spLocks noGrp="1" noRot="1" noChangeAspect="1"/>
+          </p:cNvSpPr>
+          <p:nvPr>
+            <p:ph type="sldImg"/>
+          </p:nvPr>
+        </p:nvSpPr>
+        <p:spPr/>
+      </p:sp>
+      <p:sp>
+        <p:nvSpPr>
+          <p:cNvPr id="3" name="Notes Placeholder 2"/>
+          <p:cNvSpPr>
+            <a:spLocks noGrp="1"/>
+          </p:cNvSpPr>
+          <p:nvPr>
+            <p:ph type="body" idx="1"/>
+          </p:nvPr>
+        </p:nvSpPr>
+        <p:spPr/>
+        <p:txBody>
+          <a:bodyPr/>
+          <a:lstStyle/>
+          <a:p>
+            <a:r>
+              <a:rPr lang="en-US" dirty="0" smtClean="0"/>
+              <a:t>Chrome</a:t>
+            </a:r>
+            <a:r>
+              <a:rPr lang="en-US" baseline="0" dirty="0" smtClean="0"/>
+              <a:t> 6 is the winner!</a:t>
+            </a:r>
+            <a:endParaRPr lang="en-US" dirty="0"/>
+          </a:p>
+        </p:txBody>
+      </p:sp>
+      <p:sp>
+        <p:nvSpPr>
+          <p:cNvPr id="4" name="Slide Number Placeholder 3"/>
+          <p:cNvSpPr>
+            <a:spLocks noGrp="1"/>
+          </p:cNvSpPr>
+          <p:nvPr>
+            <p:ph type="sldNum" sz="quarter" idx="10"/>
+          </p:nvPr>
+        </p:nvSpPr>
+        <p:spPr/>
+        <p:txBody>
+          <a:bodyPr/>
+          <a:lstStyle/>
+          <a:p>
+            <a:fld id="{BDB1CA01-44E6-4955-881A-F7B7682CC8B6}" type="slidenum">
+              <a:rPr lang="en-US" smtClean="0"/>
+              <a:t>11</a:t>
+            </a:fld>
+            <a:endParaRPr lang="en-US"/>
+          </a:p>
+        </p:txBody>
+      </p:sp>
+    </p:spTree>
+    <p:extLst>
+      <p:ext uri="{BB962C8B-B14F-4D97-AF65-F5344CB8AC3E}">
+        <p14:creationId xmlns:p14="http://schemas.microsoft.com/office/powerpoint/2010/main" val="3993395543"/>
+      </p:ext>
+    </p:extLst>
+  </p:cSld>
+  <p:clrMapOvr>
+    <a:masterClrMapping/>
+  </p:clrMapOvr>
+</p:notes>
+</file>
+
+<file path=ppt/notesSlides/notesSlide6.xml><?xml version="1.0" encoding="utf-8"?>
+<p:notes xmlns:a="http://schemas.openxmlformats.org/drawingml/2006/main" xmlns:r="http://schemas.openxmlformats.org/officeDocument/2006/relationships" xmlns:p="http://schemas.openxmlformats.org/presentationml/2006/main">
+  <p:cSld>
+    <p:spTree>
+      <p:nvGrpSpPr>
+        <p:cNvPr id="1" name=""/>
+        <p:cNvGrpSpPr/>
+        <p:nvPr/>
+      </p:nvGrpSpPr>
+      <p:grpSpPr>
+        <a:xfrm>
+          <a:off x="0" y="0"/>
+          <a:ext cx="0" cy="0"/>
+          <a:chOff x="0" y="0"/>
+          <a:chExt cx="0" cy="0"/>
+        </a:xfrm>
+      </p:grpSpPr>
+      <p:sp>
+        <p:nvSpPr>
+          <p:cNvPr id="2" name="Slide Image Placeholder 1"/>
+          <p:cNvSpPr>
+            <a:spLocks noGrp="1" noRot="1" noChangeAspect="1"/>
+          </p:cNvSpPr>
+          <p:nvPr>
+            <p:ph type="sldImg"/>
+          </p:nvPr>
+        </p:nvSpPr>
+        <p:spPr/>
+      </p:sp>
+      <p:sp>
+        <p:nvSpPr>
+          <p:cNvPr id="3" name="Notes Placeholder 2"/>
+          <p:cNvSpPr>
+            <a:spLocks noGrp="1"/>
+          </p:cNvSpPr>
+          <p:nvPr>
+            <p:ph type="body" idx="1"/>
+          </p:nvPr>
+        </p:nvSpPr>
+        <p:spPr/>
+        <p:txBody>
+          <a:bodyPr/>
+          <a:lstStyle/>
+          <a:p>
+            <a:r>
+              <a:rPr lang="en-US" dirty="0" smtClean="0"/>
+              <a:t>Not too much</a:t>
+            </a:r>
+            <a:r>
+              <a:rPr lang="en-US" baseline="0" dirty="0" smtClean="0"/>
+              <a:t> support for HTML5 form inputs, except for opera.  IE 9 </a:t>
+            </a:r>
+            <a:r>
+              <a:rPr lang="en-US" baseline="0" dirty="0" err="1" smtClean="0"/>
+              <a:t>isnt</a:t>
+            </a:r>
+            <a:r>
+              <a:rPr lang="en-US" baseline="0" dirty="0" smtClean="0"/>
+              <a:t> even expected to have any.</a:t>
+            </a:r>
+            <a:endParaRPr lang="en-US" dirty="0"/>
+          </a:p>
+        </p:txBody>
+      </p:sp>
+      <p:sp>
+        <p:nvSpPr>
+          <p:cNvPr id="4" name="Slide Number Placeholder 3"/>
+          <p:cNvSpPr>
+            <a:spLocks noGrp="1"/>
+          </p:cNvSpPr>
+          <p:nvPr>
+            <p:ph type="sldNum" sz="quarter" idx="10"/>
+          </p:nvPr>
+        </p:nvSpPr>
+        <p:spPr/>
+        <p:txBody>
+          <a:bodyPr/>
+          <a:lstStyle/>
+          <a:p>
+            <a:fld id="{BDB1CA01-44E6-4955-881A-F7B7682CC8B6}" type="slidenum">
+              <a:rPr lang="en-US" smtClean="0"/>
+              <a:t>12</a:t>
+            </a:fld>
+            <a:endParaRPr lang="en-US"/>
+          </a:p>
+        </p:txBody>
+      </p:sp>
+    </p:spTree>
+    <p:extLst>
+      <p:ext uri="{BB962C8B-B14F-4D97-AF65-F5344CB8AC3E}">
+        <p14:creationId xmlns:p14="http://schemas.microsoft.com/office/powerpoint/2010/main" val="2740929555"/>
+      </p:ext>
+    </p:extLst>
+  </p:cSld>
+  <p:clrMapOvr>
+    <a:masterClrMapping/>
+  </p:clrMapOvr>
+</p:notes>
+</file>
+
+<file path=ppt/notesSlides/notesSlide7.xml><?xml version="1.0" encoding="utf-8"?>
+<p:notes xmlns:a="http://schemas.openxmlformats.org/drawingml/2006/main" xmlns:r="http://schemas.openxmlformats.org/officeDocument/2006/relationships" xmlns:p="http://schemas.openxmlformats.org/presentationml/2006/main">
+  <p:cSld>
+    <p:spTree>
+      <p:nvGrpSpPr>
+        <p:cNvPr id="1" name=""/>
+        <p:cNvGrpSpPr/>
+        <p:nvPr/>
+      </p:nvGrpSpPr>
+      <p:grpSpPr>
+        <a:xfrm>
+          <a:off x="0" y="0"/>
+          <a:ext cx="0" cy="0"/>
+          <a:chOff x="0" y="0"/>
+          <a:chExt cx="0" cy="0"/>
+        </a:xfrm>
+      </p:grpSpPr>
+      <p:sp>
+        <p:nvSpPr>
+          <p:cNvPr id="2" name="Slide Image Placeholder 1"/>
+          <p:cNvSpPr>
+            <a:spLocks noGrp="1" noRot="1" noChangeAspect="1"/>
+          </p:cNvSpPr>
+          <p:nvPr>
+            <p:ph type="sldImg"/>
+          </p:nvPr>
+        </p:nvSpPr>
+        <p:spPr/>
+      </p:sp>
+      <p:sp>
+        <p:nvSpPr>
+          <p:cNvPr id="3" name="Notes Placeholder 2"/>
+          <p:cNvSpPr>
+            <a:spLocks noGrp="1"/>
+          </p:cNvSpPr>
+          <p:nvPr>
+            <p:ph type="body" idx="1"/>
+          </p:nvPr>
+        </p:nvSpPr>
+        <p:spPr/>
+        <p:txBody>
+          <a:bodyPr/>
+          <a:lstStyle/>
+          <a:p>
+            <a:r>
+              <a:rPr lang="en-US" dirty="0" err="1" smtClean="0"/>
+              <a:t>Sarfari</a:t>
+            </a:r>
+            <a:r>
+              <a:rPr lang="en-US" baseline="0" dirty="0" smtClean="0"/>
+              <a:t> 5 has the most support for HTML5 form attributes, chrome and opera are close seconds.  Again IE9 not supporting anything, though its still in beta.</a:t>
+            </a:r>
+            <a:endParaRPr lang="en-US" dirty="0"/>
+          </a:p>
+        </p:txBody>
+      </p:sp>
+      <p:sp>
+        <p:nvSpPr>
+          <p:cNvPr id="4" name="Slide Number Placeholder 3"/>
+          <p:cNvSpPr>
+            <a:spLocks noGrp="1"/>
+          </p:cNvSpPr>
+          <p:nvPr>
+            <p:ph type="sldNum" sz="quarter" idx="10"/>
+          </p:nvPr>
+        </p:nvSpPr>
+        <p:spPr/>
+        <p:txBody>
+          <a:bodyPr/>
+          <a:lstStyle/>
+          <a:p>
+            <a:fld id="{BDB1CA01-44E6-4955-881A-F7B7682CC8B6}" type="slidenum">
+              <a:rPr lang="en-US" smtClean="0"/>
+              <a:t>13</a:t>
+            </a:fld>
+            <a:endParaRPr lang="en-US"/>
+          </a:p>
+        </p:txBody>
+      </p:sp>
+    </p:spTree>
+    <p:extLst>
+      <p:ext uri="{BB962C8B-B14F-4D97-AF65-F5344CB8AC3E}">
+        <p14:creationId xmlns:p14="http://schemas.microsoft.com/office/powerpoint/2010/main" val="3029867180"/>
+      </p:ext>
+    </p:extLst>
+  </p:cSld>
+  <p:clrMapOvr>
+    <a:masterClrMapping/>
+  </p:clrMapOvr>
+</p:notes>
+</file>
+
+<file path=ppt/notesSlides/notesSlide8.xml><?xml version="1.0" encoding="utf-8"?>
+<p:notes xmlns:a="http://schemas.openxmlformats.org/drawingml/2006/main" xmlns:r="http://schemas.openxmlformats.org/officeDocument/2006/relationships" xmlns:p="http://schemas.openxmlformats.org/presentationml/2006/main">
+  <p:cSld>
+    <p:spTree>
+      <p:nvGrpSpPr>
+        <p:cNvPr id="1" name=""/>
+        <p:cNvGrpSpPr/>
+        <p:nvPr/>
+      </p:nvGrpSpPr>
+      <p:grpSpPr>
+        <a:xfrm>
+          <a:off x="0" y="0"/>
+          <a:ext cx="0" cy="0"/>
+          <a:chOff x="0" y="0"/>
+          <a:chExt cx="0" cy="0"/>
+        </a:xfrm>
+      </p:grpSpPr>
+      <p:sp>
+        <p:nvSpPr>
+          <p:cNvPr id="2" name="Slide Image Placeholder 1"/>
+          <p:cNvSpPr>
+            <a:spLocks noGrp="1" noRot="1" noChangeAspect="1"/>
+          </p:cNvSpPr>
+          <p:nvPr>
+            <p:ph type="sldImg"/>
+          </p:nvPr>
+        </p:nvSpPr>
+        <p:spPr/>
+      </p:sp>
+      <p:sp>
+        <p:nvSpPr>
+          <p:cNvPr id="3" name="Notes Placeholder 2"/>
+          <p:cNvSpPr>
+            <a:spLocks noGrp="1"/>
+          </p:cNvSpPr>
+          <p:nvPr>
+            <p:ph type="body" idx="1"/>
+          </p:nvPr>
+        </p:nvSpPr>
+        <p:spPr/>
+        <p:txBody>
+          <a:bodyPr/>
+          <a:lstStyle/>
+          <a:p>
+            <a:r>
+              <a:rPr lang="en-US" dirty="0" smtClean="0"/>
+              <a:t>Ope</a:t>
+            </a:r>
+            <a:r>
+              <a:rPr lang="en-US" baseline="0" dirty="0" smtClean="0"/>
+              <a:t>n with </a:t>
+            </a:r>
+            <a:r>
+              <a:rPr lang="en-US" baseline="0" smtClean="0"/>
+              <a:t>multiple browsers</a:t>
+            </a:r>
+            <a:endParaRPr lang="en-US"/>
+          </a:p>
+        </p:txBody>
+      </p:sp>
+      <p:sp>
+        <p:nvSpPr>
+          <p:cNvPr id="4" name="Slide Number Placeholder 3"/>
+          <p:cNvSpPr>
+            <a:spLocks noGrp="1"/>
+          </p:cNvSpPr>
+          <p:nvPr>
+            <p:ph type="sldNum" sz="quarter" idx="10"/>
+          </p:nvPr>
+        </p:nvSpPr>
+        <p:spPr/>
+        <p:txBody>
+          <a:bodyPr/>
+          <a:lstStyle/>
+          <a:p>
+            <a:fld id="{BDB1CA01-44E6-4955-881A-F7B7682CC8B6}" type="slidenum">
+              <a:rPr lang="en-US" smtClean="0"/>
+              <a:t>14</a:t>
+            </a:fld>
+            <a:endParaRPr lang="en-US"/>
+          </a:p>
+        </p:txBody>
+      </p:sp>
+    </p:spTree>
+    <p:extLst>
+      <p:ext uri="{BB962C8B-B14F-4D97-AF65-F5344CB8AC3E}">
+        <p14:creationId xmlns:p14="http://schemas.microsoft.com/office/powerpoint/2010/main" val="940200116"/>
       </p:ext>
     </p:extLst>
   </p:cSld>
@@ -14757,19 +15428,7 @@
           <a:p>
             <a:r>
               <a:rPr lang="en-US" dirty="0" smtClean="0"/>
-              <a:t>The </a:t>
-            </a:r>
-            <a:r>
-              <a:rPr lang="en-US" dirty="0" smtClean="0"/>
-              <a:t>next generation of</a:t>
-            </a:r>
-            <a:r>
-              <a:rPr lang="en-US" dirty="0" smtClean="0"/>
-              <a:t> </a:t>
-            </a:r>
-            <a:r>
-              <a:rPr lang="en-US" dirty="0" smtClean="0"/>
-              <a:t>web programming</a:t>
+              <a:t>The next generation of web programming</a:t>
             </a:r>
             <a:endParaRPr lang="en-US" dirty="0"/>
           </a:p>
@@ -14814,7 +15473,7 @@
           <p:nvPr/>
         </p:nvPicPr>
         <p:blipFill>
-          <a:blip r:embed="rId2">
+          <a:blip r:embed="rId3">
             <a:extLst>
               <a:ext uri="{28A0092B-C50C-407E-A947-70E740481C1C}">
                 <a14:useLocalDpi xmlns:a14="http://schemas.microsoft.com/office/drawing/2010/main" val="0"/>
@@ -14874,7 +15533,7 @@
           <p:nvPr/>
         </p:nvPicPr>
         <p:blipFill>
-          <a:blip r:embed="rId2">
+          <a:blip r:embed="rId3">
             <a:extLst>
               <a:ext uri="{28A0092B-C50C-407E-A947-70E740481C1C}">
                 <a14:useLocalDpi xmlns:a14="http://schemas.microsoft.com/office/drawing/2010/main" val="0"/>
@@ -14934,7 +15593,7 @@
           <p:nvPr/>
         </p:nvPicPr>
         <p:blipFill>
-          <a:blip r:embed="rId2">
+          <a:blip r:embed="rId3">
             <a:extLst>
               <a:ext uri="{28A0092B-C50C-407E-A947-70E740481C1C}">
                 <a14:useLocalDpi xmlns:a14="http://schemas.microsoft.com/office/drawing/2010/main" val="0"/>
@@ -15001,7 +15660,7 @@
           <p:nvPr/>
         </p:nvPicPr>
         <p:blipFill>
-          <a:blip r:embed="rId2">
+          <a:blip r:embed="rId3">
             <a:extLst>
               <a:ext uri="{28A0092B-C50C-407E-A947-70E740481C1C}">
                 <a14:useLocalDpi xmlns:a14="http://schemas.microsoft.com/office/drawing/2010/main" val="0"/>
@@ -15039,6 +15698,87 @@
       </p:par>
     </p:tnLst>
   </p:timing>
+</p:sld>
+</file>
+
+<file path=ppt/slides/slide14.xml><?xml version="1.0" encoding="utf-8"?>
+<p:sld xmlns:a="http://schemas.openxmlformats.org/drawingml/2006/main" xmlns:r="http://schemas.openxmlformats.org/officeDocument/2006/relationships" xmlns:p="http://schemas.openxmlformats.org/presentationml/2006/main">
+  <p:cSld>
+    <p:spTree>
+      <p:nvGrpSpPr>
+        <p:cNvPr id="1" name=""/>
+        <p:cNvGrpSpPr/>
+        <p:nvPr/>
+      </p:nvGrpSpPr>
+      <p:grpSpPr>
+        <a:xfrm>
+          <a:off x="0" y="0"/>
+          <a:ext cx="0" cy="0"/>
+          <a:chOff x="0" y="0"/>
+          <a:chExt cx="0" cy="0"/>
+        </a:xfrm>
+      </p:grpSpPr>
+      <p:sp>
+        <p:nvSpPr>
+          <p:cNvPr id="2" name="Title 1"/>
+          <p:cNvSpPr>
+            <a:spLocks noGrp="1"/>
+          </p:cNvSpPr>
+          <p:nvPr>
+            <p:ph type="title"/>
+          </p:nvPr>
+        </p:nvSpPr>
+        <p:spPr/>
+        <p:txBody>
+          <a:bodyPr/>
+          <a:lstStyle/>
+          <a:p>
+            <a:r>
+              <a:rPr lang="en-US" dirty="0" smtClean="0"/>
+              <a:t>Test</a:t>
+            </a:r>
+            <a:endParaRPr lang="en-US" dirty="0"/>
+          </a:p>
+        </p:txBody>
+      </p:sp>
+      <p:sp>
+        <p:nvSpPr>
+          <p:cNvPr id="3" name="Content Placeholder 2"/>
+          <p:cNvSpPr>
+            <a:spLocks noGrp="1"/>
+          </p:cNvSpPr>
+          <p:nvPr>
+            <p:ph idx="1"/>
+          </p:nvPr>
+        </p:nvSpPr>
+        <p:spPr/>
+        <p:txBody>
+          <a:bodyPr/>
+          <a:lstStyle/>
+          <a:p>
+            <a:r>
+              <a:rPr lang="en-US" dirty="0" smtClean="0">
+                <a:hlinkClick r:id="rId3"/>
+              </a:rPr>
+              <a:t>HTML5 Test</a:t>
+            </a:r>
+            <a:endParaRPr lang="en-US" dirty="0" smtClean="0"/>
+          </a:p>
+          <a:p>
+            <a:endParaRPr lang="en-US" dirty="0"/>
+          </a:p>
+        </p:txBody>
+      </p:sp>
+    </p:spTree>
+    <p:extLst>
+      <p:ext uri="{BB962C8B-B14F-4D97-AF65-F5344CB8AC3E}">
+        <p14:creationId xmlns:p14="http://schemas.microsoft.com/office/powerpoint/2010/main" val="2898697771"/>
+      </p:ext>
+    </p:extLst>
+  </p:cSld>
+  <p:clrMapOvr>
+    <a:masterClrMapping/>
+  </p:clrMapOvr>
 </p:sld>
 </file>
 
@@ -15269,11 +16009,7 @@
           <a:p>
             <a:r>
               <a:rPr lang="en-US" dirty="0" smtClean="0"/>
-              <a:t>Where it all </a:t>
-            </a:r>
-            <a:r>
-              <a:rPr lang="en-US" dirty="0" smtClean="0"/>
-              <a:t>began CONT.</a:t>
+              <a:t>Where it all began CONT.</a:t>
             </a:r>
             <a:endParaRPr lang="en-US" dirty="0"/>
           </a:p>
@@ -15439,13 +16175,8 @@
           <a:p>
             <a:r>
               <a:rPr lang="en-US" dirty="0" smtClean="0"/>
-              <a:t>HTML </a:t>
+              <a:t>HTML 2.0 November 1995</a:t>
             </a:r>
-            <a:r>
-              <a:rPr lang="en-US" dirty="0" smtClean="0"/>
-              <a:t>2.0 November 1995</a:t>
-            </a:r>
-            <a:endParaRPr lang="en-US" dirty="0" smtClean="0"/>
           </a:p>
           <a:p>
             <a:pPr lvl="1"/>
@@ -15495,11 +16226,7 @@
           <a:p>
             <a:r>
               <a:rPr lang="en-US" dirty="0" smtClean="0"/>
-              <a:t>HTML </a:t>
-            </a:r>
-            <a:r>
-              <a:rPr lang="en-US" dirty="0" smtClean="0"/>
-              <a:t>3.2 January 1997</a:t>
+              <a:t>HTML 3.2 January 1997</a:t>
             </a:r>
           </a:p>
           <a:p>
@@ -15806,7 +16533,7 @@
           <p:nvPr/>
         </p:nvPicPr>
         <p:blipFill>
-          <a:blip r:embed="rId2">
+          <a:blip r:embed="rId3">
             <a:extLst>
               <a:ext uri="{28A0092B-C50C-407E-A947-70E740481C1C}">
                 <a14:useLocalDpi xmlns:a14="http://schemas.microsoft.com/office/drawing/2010/main" val="0"/>
@@ -15866,7 +16593,7 @@
           <p:nvPr/>
         </p:nvPicPr>
         <p:blipFill>
-          <a:blip r:embed="rId2">
+          <a:blip r:embed="rId3">
             <a:extLst>
               <a:ext uri="{28A0092B-C50C-407E-A947-70E740481C1C}">
                 <a14:useLocalDpi xmlns:a14="http://schemas.microsoft.com/office/drawing/2010/main" val="0"/>

</xml_diff>

<commit_message>
added slides for local storage and offline applications
</commit_message>
<xml_diff>
--- a/HTML 5.pptx
+++ b/HTML 5.pptx
@@ -5,7 +5,7 @@
     <p:sldMasterId id="2147483672" r:id="rId1"/>
   </p:sldMasterIdLst>
   <p:notesMasterIdLst>
-    <p:notesMasterId r:id="rId16"/>
+    <p:notesMasterId r:id="rId18"/>
   </p:notesMasterIdLst>
   <p:sldIdLst>
     <p:sldId id="256" r:id="rId2"/>
@@ -14,14 +14,16 @@
     <p:sldId id="257" r:id="rId5"/>
     <p:sldId id="258" r:id="rId6"/>
     <p:sldId id="268" r:id="rId7"/>
-    <p:sldId id="266" r:id="rId8"/>
-    <p:sldId id="260" r:id="rId9"/>
-    <p:sldId id="261" r:id="rId10"/>
-    <p:sldId id="262" r:id="rId11"/>
-    <p:sldId id="263" r:id="rId12"/>
-    <p:sldId id="264" r:id="rId13"/>
-    <p:sldId id="265" r:id="rId14"/>
-    <p:sldId id="269" r:id="rId15"/>
+    <p:sldId id="270" r:id="rId8"/>
+    <p:sldId id="271" r:id="rId9"/>
+    <p:sldId id="266" r:id="rId10"/>
+    <p:sldId id="260" r:id="rId11"/>
+    <p:sldId id="261" r:id="rId12"/>
+    <p:sldId id="262" r:id="rId13"/>
+    <p:sldId id="263" r:id="rId14"/>
+    <p:sldId id="264" r:id="rId15"/>
+    <p:sldId id="265" r:id="rId16"/>
+    <p:sldId id="269" r:id="rId17"/>
   </p:sldIdLst>
   <p:sldSz cx="9144000" cy="6858000" type="screen4x3"/>
   <p:notesSz cx="6858000" cy="9144000"/>
@@ -205,7 +207,7 @@
           <a:p>
             <a:fld id="{37BA4401-E857-4CEC-9D7B-FB4EC38016BB}" type="datetimeFigureOut">
               <a:rPr lang="en-US" smtClean="0"/>
-              <a:t>10/4/2010</a:t>
+              <a:t>10/5/2010</a:t>
             </a:fld>
             <a:endParaRPr lang="en-US"/>
           </a:p>
@@ -565,6 +567,102 @@
 </p:notes>
 </file>
 
+<file path=ppt/notesSlides/notesSlide10.xml><?xml version="1.0" encoding="utf-8"?>
+<p:notes xmlns:a="http://schemas.openxmlformats.org/drawingml/2006/main" xmlns:r="http://schemas.openxmlformats.org/officeDocument/2006/relationships" xmlns:p="http://schemas.openxmlformats.org/presentationml/2006/main">
+  <p:cSld>
+    <p:spTree>
+      <p:nvGrpSpPr>
+        <p:cNvPr id="1" name=""/>
+        <p:cNvGrpSpPr/>
+        <p:nvPr/>
+      </p:nvGrpSpPr>
+      <p:grpSpPr>
+        <a:xfrm>
+          <a:off x="0" y="0"/>
+          <a:ext cx="0" cy="0"/>
+          <a:chOff x="0" y="0"/>
+          <a:chExt cx="0" cy="0"/>
+        </a:xfrm>
+      </p:grpSpPr>
+      <p:sp>
+        <p:nvSpPr>
+          <p:cNvPr id="2" name="Slide Image Placeholder 1"/>
+          <p:cNvSpPr>
+            <a:spLocks noGrp="1" noRot="1" noChangeAspect="1"/>
+          </p:cNvSpPr>
+          <p:nvPr>
+            <p:ph type="sldImg"/>
+          </p:nvPr>
+        </p:nvSpPr>
+        <p:spPr/>
+      </p:sp>
+      <p:sp>
+        <p:nvSpPr>
+          <p:cNvPr id="3" name="Notes Placeholder 2"/>
+          <p:cNvSpPr>
+            <a:spLocks noGrp="1"/>
+          </p:cNvSpPr>
+          <p:nvPr>
+            <p:ph type="body" idx="1"/>
+          </p:nvPr>
+        </p:nvSpPr>
+        <p:spPr/>
+        <p:txBody>
+          <a:bodyPr/>
+          <a:lstStyle/>
+          <a:p>
+            <a:r>
+              <a:rPr lang="en-US" dirty="0" smtClean="0"/>
+              <a:t>Ope</a:t>
+            </a:r>
+            <a:r>
+              <a:rPr lang="en-US" baseline="0" dirty="0" smtClean="0"/>
+              <a:t>n with </a:t>
+            </a:r>
+            <a:r>
+              <a:rPr lang="en-US" baseline="0" smtClean="0"/>
+              <a:t>multiple browsers</a:t>
+            </a:r>
+            <a:endParaRPr lang="en-US"/>
+          </a:p>
+        </p:txBody>
+      </p:sp>
+      <p:sp>
+        <p:nvSpPr>
+          <p:cNvPr id="4" name="Slide Number Placeholder 3"/>
+          <p:cNvSpPr>
+            <a:spLocks noGrp="1"/>
+          </p:cNvSpPr>
+          <p:nvPr>
+            <p:ph type="sldNum" sz="quarter" idx="10"/>
+          </p:nvPr>
+        </p:nvSpPr>
+        <p:spPr/>
+        <p:txBody>
+          <a:bodyPr/>
+          <a:lstStyle/>
+          <a:p>
+            <a:fld id="{BDB1CA01-44E6-4955-881A-F7B7682CC8B6}" type="slidenum">
+              <a:rPr lang="en-US" smtClean="0"/>
+              <a:t>16</a:t>
+            </a:fld>
+            <a:endParaRPr lang="en-US"/>
+          </a:p>
+        </p:txBody>
+      </p:sp>
+    </p:spTree>
+    <p:extLst>
+      <p:ext uri="{BB962C8B-B14F-4D97-AF65-F5344CB8AC3E}">
+        <p14:creationId xmlns:p14="http://schemas.microsoft.com/office/powerpoint/2010/main" val="940200116"/>
+      </p:ext>
+    </p:extLst>
+  </p:cSld>
+  <p:clrMapOvr>
+    <a:masterClrMapping/>
+  </p:clrMapOvr>
+</p:notes>
+</file>
+
 <file path=ppt/notesSlides/notesSlide2.xml><?xml version="1.0" encoding="utf-8"?>
 <p:notes xmlns:a="http://schemas.openxmlformats.org/drawingml/2006/main" xmlns:r="http://schemas.openxmlformats.org/officeDocument/2006/relationships" xmlns:p="http://schemas.openxmlformats.org/presentationml/2006/main">
   <p:cSld>
@@ -610,19 +708,191 @@
           <a:lstStyle/>
           <a:p>
             <a:r>
-              <a:rPr lang="en-US" dirty="0" smtClean="0"/>
-              <a:t>Can obviously see that IE is lacking, this is a theme for the next 5 slides.  IE 9 does</a:t>
-            </a:r>
-            <a:r>
-              <a:rPr lang="en-US" baseline="0" dirty="0" smtClean="0"/>
-              <a:t> become more “useable,” but is still lacking compared to other browsers.</a:t>
-            </a:r>
-          </a:p>
-          <a:p>
-            <a:r>
-              <a:rPr lang="en-US" baseline="0" dirty="0" smtClean="0"/>
-              <a:t>Best: Chrome 5, 6 and Safari 5  on both mac and windows</a:t>
-            </a:r>
+              <a:rPr lang="en-US" sz="1200" b="0" i="0" kern="1200" dirty="0" smtClean="0">
+                <a:solidFill>
+                  <a:schemeClr val="tx1"/>
+                </a:solidFill>
+                <a:effectLst/>
+                <a:latin typeface="+mn-lt"/>
+                <a:ea typeface="+mn-ea"/>
+                <a:cs typeface="+mn-cs"/>
+              </a:rPr>
+              <a:t>Calling </a:t>
+            </a:r>
+            <a:r>
+              <a:rPr lang="en-US" sz="1200" b="0" i="0" kern="1200" dirty="0" err="1" smtClean="0">
+                <a:solidFill>
+                  <a:schemeClr val="tx1"/>
+                </a:solidFill>
+                <a:effectLst/>
+                <a:latin typeface="+mn-lt"/>
+                <a:ea typeface="+mn-ea"/>
+                <a:cs typeface="+mn-cs"/>
+              </a:rPr>
+              <a:t>setItem</a:t>
+            </a:r>
+            <a:r>
+              <a:rPr lang="en-US" sz="1200" b="0" i="0" kern="1200" dirty="0" smtClean="0">
+                <a:solidFill>
+                  <a:schemeClr val="tx1"/>
+                </a:solidFill>
+                <a:effectLst/>
+                <a:latin typeface="+mn-lt"/>
+                <a:ea typeface="+mn-ea"/>
+                <a:cs typeface="+mn-cs"/>
+              </a:rPr>
+              <a:t>() with a named key that already exists will silently overwrite the previous value. Calling </a:t>
+            </a:r>
+            <a:r>
+              <a:rPr lang="en-US" sz="1200" b="0" i="0" kern="1200" dirty="0" err="1" smtClean="0">
+                <a:solidFill>
+                  <a:schemeClr val="tx1"/>
+                </a:solidFill>
+                <a:effectLst/>
+                <a:latin typeface="+mn-lt"/>
+                <a:ea typeface="+mn-ea"/>
+                <a:cs typeface="+mn-cs"/>
+              </a:rPr>
+              <a:t>getItem</a:t>
+            </a:r>
+            <a:r>
+              <a:rPr lang="en-US" sz="1200" b="0" i="0" kern="1200" dirty="0" smtClean="0">
+                <a:solidFill>
+                  <a:schemeClr val="tx1"/>
+                </a:solidFill>
+                <a:effectLst/>
+                <a:latin typeface="+mn-lt"/>
+                <a:ea typeface="+mn-ea"/>
+                <a:cs typeface="+mn-cs"/>
+              </a:rPr>
+              <a:t>() with a non-existent key will return null rather than throw an exception.</a:t>
+            </a:r>
+          </a:p>
+          <a:p>
+            <a:r>
+              <a:rPr lang="en-US" sz="1200" b="0" i="0" kern="1200" dirty="0" smtClean="0">
+                <a:solidFill>
+                  <a:schemeClr val="tx1"/>
+                </a:solidFill>
+                <a:effectLst/>
+                <a:latin typeface="+mn-lt"/>
+                <a:ea typeface="+mn-ea"/>
+                <a:cs typeface="+mn-cs"/>
+              </a:rPr>
+              <a:t>Some browsers,</a:t>
+            </a:r>
+            <a:r>
+              <a:rPr lang="en-US" sz="1200" b="0" i="0" kern="1200" baseline="0" dirty="0" smtClean="0">
+                <a:solidFill>
+                  <a:schemeClr val="tx1"/>
+                </a:solidFill>
+                <a:effectLst/>
+                <a:latin typeface="+mn-lt"/>
+                <a:ea typeface="+mn-ea"/>
+                <a:cs typeface="+mn-cs"/>
+              </a:rPr>
+              <a:t> Opera, </a:t>
+            </a:r>
+            <a:r>
+              <a:rPr lang="en-US" sz="1200" b="0" i="0" kern="1200" dirty="0" smtClean="0">
+                <a:solidFill>
+                  <a:schemeClr val="tx1"/>
+                </a:solidFill>
+                <a:effectLst/>
+                <a:latin typeface="+mn-lt"/>
+                <a:ea typeface="+mn-ea"/>
+                <a:cs typeface="+mn-cs"/>
+              </a:rPr>
+              <a:t>allow the user to control each site’s storage quota, but it is purely a user-initiated action, not something that you as a web developer can build into your web application.</a:t>
+            </a:r>
+          </a:p>
+          <a:p>
+            <a:r>
+              <a:rPr lang="en-US" sz="1200" b="0" i="0" kern="1200" dirty="0" smtClean="0">
+                <a:solidFill>
+                  <a:schemeClr val="tx1"/>
+                </a:solidFill>
+                <a:effectLst/>
+                <a:latin typeface="+mn-lt"/>
+                <a:ea typeface="+mn-ea"/>
+                <a:cs typeface="+mn-cs"/>
+              </a:rPr>
+              <a:t>If you are storing and retrieving anything other than strings, you will need to use functions like </a:t>
+            </a:r>
+            <a:r>
+              <a:rPr lang="en-US" sz="1200" b="0" i="0" kern="1200" dirty="0" err="1" smtClean="0">
+                <a:solidFill>
+                  <a:schemeClr val="tx1"/>
+                </a:solidFill>
+                <a:effectLst/>
+                <a:latin typeface="+mn-lt"/>
+                <a:ea typeface="+mn-ea"/>
+                <a:cs typeface="+mn-cs"/>
+              </a:rPr>
+              <a:t>parseInt</a:t>
+            </a:r>
+            <a:r>
+              <a:rPr lang="en-US" sz="1200" b="0" i="0" kern="1200" dirty="0" smtClean="0">
+                <a:solidFill>
+                  <a:schemeClr val="tx1"/>
+                </a:solidFill>
+                <a:effectLst/>
+                <a:latin typeface="+mn-lt"/>
+                <a:ea typeface="+mn-ea"/>
+                <a:cs typeface="+mn-cs"/>
+              </a:rPr>
+              <a:t>() or </a:t>
+            </a:r>
+            <a:r>
+              <a:rPr lang="en-US" sz="1200" b="0" i="0" kern="1200" dirty="0" err="1" smtClean="0">
+                <a:solidFill>
+                  <a:schemeClr val="tx1"/>
+                </a:solidFill>
+                <a:effectLst/>
+                <a:latin typeface="+mn-lt"/>
+                <a:ea typeface="+mn-ea"/>
+                <a:cs typeface="+mn-cs"/>
+              </a:rPr>
+              <a:t>parseFloat</a:t>
+            </a:r>
+            <a:r>
+              <a:rPr lang="en-US" sz="1200" b="0" i="0" kern="1200" dirty="0" smtClean="0">
+                <a:solidFill>
+                  <a:schemeClr val="tx1"/>
+                </a:solidFill>
+                <a:effectLst/>
+                <a:latin typeface="+mn-lt"/>
+                <a:ea typeface="+mn-ea"/>
+                <a:cs typeface="+mn-cs"/>
+              </a:rPr>
+              <a:t>() to coerce your retrieved data into the expected JavaScript </a:t>
+            </a:r>
+            <a:r>
+              <a:rPr lang="en-US" sz="1200" b="0" i="0" kern="1200" dirty="0" err="1" smtClean="0">
+                <a:solidFill>
+                  <a:schemeClr val="tx1"/>
+                </a:solidFill>
+                <a:effectLst/>
+                <a:latin typeface="+mn-lt"/>
+                <a:ea typeface="+mn-ea"/>
+                <a:cs typeface="+mn-cs"/>
+              </a:rPr>
+              <a:t>datatype</a:t>
+            </a:r>
+            <a:r>
+              <a:rPr lang="en-US" sz="1200" b="0" i="0" kern="1200" dirty="0" smtClean="0">
+                <a:solidFill>
+                  <a:schemeClr val="tx1"/>
+                </a:solidFill>
+                <a:effectLst/>
+                <a:latin typeface="+mn-lt"/>
+                <a:ea typeface="+mn-ea"/>
+                <a:cs typeface="+mn-cs"/>
+              </a:rPr>
+              <a:t>.</a:t>
+            </a:r>
+          </a:p>
+          <a:p>
             <a:endParaRPr lang="en-US" dirty="0"/>
           </a:p>
         </p:txBody>
@@ -644,7 +914,7 @@
           <a:p>
             <a:fld id="{BDB1CA01-44E6-4955-881A-F7B7682CC8B6}" type="slidenum">
               <a:rPr lang="en-US" smtClean="0"/>
-              <a:t>8</a:t>
+              <a:t>7</a:t>
             </a:fld>
             <a:endParaRPr lang="en-US"/>
           </a:p>
@@ -653,7 +923,7 @@
     </p:spTree>
     <p:extLst>
       <p:ext uri="{BB962C8B-B14F-4D97-AF65-F5344CB8AC3E}">
-        <p14:creationId xmlns:p14="http://schemas.microsoft.com/office/powerpoint/2010/main" val="2088620080"/>
+        <p14:creationId xmlns:p14="http://schemas.microsoft.com/office/powerpoint/2010/main" val="1547011357"/>
       </p:ext>
     </p:extLst>
   </p:cSld>
@@ -708,12 +978,16 @@
           <a:lstStyle/>
           <a:p>
             <a:r>
-              <a:rPr lang="en-US" dirty="0" smtClean="0"/>
-              <a:t>Pretty much anything but</a:t>
-            </a:r>
-            <a:r>
-              <a:rPr lang="en-US" baseline="0" dirty="0" smtClean="0"/>
-              <a:t> IE 8 and less…</a:t>
+              <a:rPr lang="en-US" sz="1200" b="0" i="0" kern="1200" dirty="0" smtClean="0">
+                <a:solidFill>
+                  <a:schemeClr val="tx1"/>
+                </a:solidFill>
+                <a:effectLst/>
+                <a:latin typeface="+mn-lt"/>
+                <a:ea typeface="+mn-ea"/>
+                <a:cs typeface="+mn-cs"/>
+              </a:rPr>
+              <a:t>A web browser that implements HTML5 offline applications will read the list of URLs from the manifest file, download the resources, cache them locally, and automatically keep the local copies up to date as they change. </a:t>
             </a:r>
             <a:endParaRPr lang="en-US" dirty="0"/>
           </a:p>
@@ -736,7 +1010,7 @@
           <a:p>
             <a:fld id="{BDB1CA01-44E6-4955-881A-F7B7682CC8B6}" type="slidenum">
               <a:rPr lang="en-US" smtClean="0"/>
-              <a:t>9</a:t>
+              <a:t>8</a:t>
             </a:fld>
             <a:endParaRPr lang="en-US"/>
           </a:p>
@@ -745,7 +1019,7 @@
     </p:spTree>
     <p:extLst>
       <p:ext uri="{BB962C8B-B14F-4D97-AF65-F5344CB8AC3E}">
-        <p14:creationId xmlns:p14="http://schemas.microsoft.com/office/powerpoint/2010/main" val="3968686592"/>
+        <p14:creationId xmlns:p14="http://schemas.microsoft.com/office/powerpoint/2010/main" val="517990324"/>
       </p:ext>
     </p:extLst>
   </p:cSld>
@@ -801,19 +1075,17 @@
           <a:p>
             <a:r>
               <a:rPr lang="en-US" dirty="0" smtClean="0"/>
-              <a:t>Again Chrome and Safari tie</a:t>
+              <a:t>Can obviously see that IE is lacking, this is a theme for the next 5 slides.  IE 9 does</a:t>
             </a:r>
             <a:r>
               <a:rPr lang="en-US" baseline="0" dirty="0" smtClean="0"/>
-              <a:t> for most compatible, but safari supports wav instead of </a:t>
-            </a:r>
-            <a:r>
-              <a:rPr lang="en-US" baseline="0" dirty="0" err="1" smtClean="0"/>
-              <a:t>ogg</a:t>
-            </a:r>
+              <a:t> become more “useable,” but is still lacking compared to other browsers.</a:t>
+            </a:r>
+          </a:p>
+          <a:p>
             <a:r>
               <a:rPr lang="en-US" baseline="0" dirty="0" smtClean="0"/>
-              <a:t> while chrome is opposite.</a:t>
+              <a:t>Best: Chrome 5, 6 and Safari 5  on both mac and windows</a:t>
             </a:r>
             <a:endParaRPr lang="en-US" dirty="0"/>
           </a:p>
@@ -845,7 +1117,7 @@
     </p:spTree>
     <p:extLst>
       <p:ext uri="{BB962C8B-B14F-4D97-AF65-F5344CB8AC3E}">
-        <p14:creationId xmlns:p14="http://schemas.microsoft.com/office/powerpoint/2010/main" val="837441399"/>
+        <p14:creationId xmlns:p14="http://schemas.microsoft.com/office/powerpoint/2010/main" val="2088620080"/>
       </p:ext>
     </p:extLst>
   </p:cSld>
@@ -901,11 +1173,11 @@
           <a:p>
             <a:r>
               <a:rPr lang="en-US" dirty="0" smtClean="0"/>
-              <a:t>Chrome</a:t>
+              <a:t>Pretty much anything but</a:t>
             </a:r>
             <a:r>
               <a:rPr lang="en-US" baseline="0" dirty="0" smtClean="0"/>
-              <a:t> 6 is the winner!</a:t>
+              <a:t> IE 8 and less…</a:t>
             </a:r>
             <a:endParaRPr lang="en-US" dirty="0"/>
           </a:p>
@@ -937,7 +1209,7 @@
     </p:spTree>
     <p:extLst>
       <p:ext uri="{BB962C8B-B14F-4D97-AF65-F5344CB8AC3E}">
-        <p14:creationId xmlns:p14="http://schemas.microsoft.com/office/powerpoint/2010/main" val="3993395543"/>
+        <p14:creationId xmlns:p14="http://schemas.microsoft.com/office/powerpoint/2010/main" val="3968686592"/>
       </p:ext>
     </p:extLst>
   </p:cSld>
@@ -993,19 +1265,19 @@
           <a:p>
             <a:r>
               <a:rPr lang="en-US" dirty="0" smtClean="0"/>
-              <a:t>Not too much</a:t>
+              <a:t>Again Chrome and Safari tie</a:t>
             </a:r>
             <a:r>
               <a:rPr lang="en-US" baseline="0" dirty="0" smtClean="0"/>
-              <a:t> support for HTML5 form inputs, except for opera.  IE 9 </a:t>
+              <a:t> for most compatible, but safari supports wav instead of </a:t>
             </a:r>
             <a:r>
               <a:rPr lang="en-US" baseline="0" dirty="0" err="1" smtClean="0"/>
-              <a:t>isnt</a:t>
+              <a:t>ogg</a:t>
             </a:r>
             <a:r>
               <a:rPr lang="en-US" baseline="0" dirty="0" smtClean="0"/>
-              <a:t> even expected to have any.</a:t>
+              <a:t> while chrome is opposite.</a:t>
             </a:r>
             <a:endParaRPr lang="en-US" dirty="0"/>
           </a:p>
@@ -1037,7 +1309,7 @@
     </p:spTree>
     <p:extLst>
       <p:ext uri="{BB962C8B-B14F-4D97-AF65-F5344CB8AC3E}">
-        <p14:creationId xmlns:p14="http://schemas.microsoft.com/office/powerpoint/2010/main" val="2740929555"/>
+        <p14:creationId xmlns:p14="http://schemas.microsoft.com/office/powerpoint/2010/main" val="837441399"/>
       </p:ext>
     </p:extLst>
   </p:cSld>
@@ -1092,12 +1364,12 @@
           <a:lstStyle/>
           <a:p>
             <a:r>
-              <a:rPr lang="en-US" dirty="0" err="1" smtClean="0"/>
-              <a:t>Sarfari</a:t>
+              <a:rPr lang="en-US" dirty="0" smtClean="0"/>
+              <a:t>Chrome</a:t>
             </a:r>
             <a:r>
               <a:rPr lang="en-US" baseline="0" dirty="0" smtClean="0"/>
-              <a:t> 5 has the most support for HTML5 form attributes, chrome and opera are close seconds.  Again IE9 not supporting anything, though its still in beta.</a:t>
+              <a:t> 6 is the winner!</a:t>
             </a:r>
             <a:endParaRPr lang="en-US" dirty="0"/>
           </a:p>
@@ -1129,7 +1401,7 @@
     </p:spTree>
     <p:extLst>
       <p:ext uri="{BB962C8B-B14F-4D97-AF65-F5344CB8AC3E}">
-        <p14:creationId xmlns:p14="http://schemas.microsoft.com/office/powerpoint/2010/main" val="3029867180"/>
+        <p14:creationId xmlns:p14="http://schemas.microsoft.com/office/powerpoint/2010/main" val="3993395543"/>
       </p:ext>
     </p:extLst>
   </p:cSld>
@@ -1185,17 +1457,21 @@
           <a:p>
             <a:r>
               <a:rPr lang="en-US" dirty="0" smtClean="0"/>
-              <a:t>Ope</a:t>
+              <a:t>Not too much</a:t>
             </a:r>
             <a:r>
               <a:rPr lang="en-US" baseline="0" dirty="0" smtClean="0"/>
-              <a:t>n with </a:t>
-            </a:r>
-            <a:r>
-              <a:rPr lang="en-US" baseline="0" smtClean="0"/>
-              <a:t>multiple browsers</a:t>
-            </a:r>
-            <a:endParaRPr lang="en-US"/>
+              <a:t> support for HTML5 form inputs, except for opera.  IE 9 </a:t>
+            </a:r>
+            <a:r>
+              <a:rPr lang="en-US" baseline="0" dirty="0" err="1" smtClean="0"/>
+              <a:t>isnt</a:t>
+            </a:r>
+            <a:r>
+              <a:rPr lang="en-US" baseline="0" dirty="0" smtClean="0"/>
+              <a:t> even expected to have any.</a:t>
+            </a:r>
+            <a:endParaRPr lang="en-US" dirty="0"/>
           </a:p>
         </p:txBody>
       </p:sp>
@@ -1225,7 +1501,99 @@
     </p:spTree>
     <p:extLst>
       <p:ext uri="{BB962C8B-B14F-4D97-AF65-F5344CB8AC3E}">
-        <p14:creationId xmlns:p14="http://schemas.microsoft.com/office/powerpoint/2010/main" val="940200116"/>
+        <p14:creationId xmlns:p14="http://schemas.microsoft.com/office/powerpoint/2010/main" val="2740929555"/>
+      </p:ext>
+    </p:extLst>
+  </p:cSld>
+  <p:clrMapOvr>
+    <a:masterClrMapping/>
+  </p:clrMapOvr>
+</p:notes>
+</file>
+
+<file path=ppt/notesSlides/notesSlide9.xml><?xml version="1.0" encoding="utf-8"?>
+<p:notes xmlns:a="http://schemas.openxmlformats.org/drawingml/2006/main" xmlns:r="http://schemas.openxmlformats.org/officeDocument/2006/relationships" xmlns:p="http://schemas.openxmlformats.org/presentationml/2006/main">
+  <p:cSld>
+    <p:spTree>
+      <p:nvGrpSpPr>
+        <p:cNvPr id="1" name=""/>
+        <p:cNvGrpSpPr/>
+        <p:nvPr/>
+      </p:nvGrpSpPr>
+      <p:grpSpPr>
+        <a:xfrm>
+          <a:off x="0" y="0"/>
+          <a:ext cx="0" cy="0"/>
+          <a:chOff x="0" y="0"/>
+          <a:chExt cx="0" cy="0"/>
+        </a:xfrm>
+      </p:grpSpPr>
+      <p:sp>
+        <p:nvSpPr>
+          <p:cNvPr id="2" name="Slide Image Placeholder 1"/>
+          <p:cNvSpPr>
+            <a:spLocks noGrp="1" noRot="1" noChangeAspect="1"/>
+          </p:cNvSpPr>
+          <p:nvPr>
+            <p:ph type="sldImg"/>
+          </p:nvPr>
+        </p:nvSpPr>
+        <p:spPr/>
+      </p:sp>
+      <p:sp>
+        <p:nvSpPr>
+          <p:cNvPr id="3" name="Notes Placeholder 2"/>
+          <p:cNvSpPr>
+            <a:spLocks noGrp="1"/>
+          </p:cNvSpPr>
+          <p:nvPr>
+            <p:ph type="body" idx="1"/>
+          </p:nvPr>
+        </p:nvSpPr>
+        <p:spPr/>
+        <p:txBody>
+          <a:bodyPr/>
+          <a:lstStyle/>
+          <a:p>
+            <a:r>
+              <a:rPr lang="en-US" dirty="0" err="1" smtClean="0"/>
+              <a:t>Sarfari</a:t>
+            </a:r>
+            <a:r>
+              <a:rPr lang="en-US" baseline="0" dirty="0" smtClean="0"/>
+              <a:t> 5 has the most support for HTML5 form attributes, chrome and opera are close seconds.  Again IE9 not supporting anything, though its still in beta.</a:t>
+            </a:r>
+            <a:endParaRPr lang="en-US" dirty="0"/>
+          </a:p>
+        </p:txBody>
+      </p:sp>
+      <p:sp>
+        <p:nvSpPr>
+          <p:cNvPr id="4" name="Slide Number Placeholder 3"/>
+          <p:cNvSpPr>
+            <a:spLocks noGrp="1"/>
+          </p:cNvSpPr>
+          <p:nvPr>
+            <p:ph type="sldNum" sz="quarter" idx="10"/>
+          </p:nvPr>
+        </p:nvSpPr>
+        <p:spPr/>
+        <p:txBody>
+          <a:bodyPr/>
+          <a:lstStyle/>
+          <a:p>
+            <a:fld id="{BDB1CA01-44E6-4955-881A-F7B7682CC8B6}" type="slidenum">
+              <a:rPr lang="en-US" smtClean="0"/>
+              <a:t>15</a:t>
+            </a:fld>
+            <a:endParaRPr lang="en-US"/>
+          </a:p>
+        </p:txBody>
+      </p:sp>
+    </p:spTree>
+    <p:extLst>
+      <p:ext uri="{BB962C8B-B14F-4D97-AF65-F5344CB8AC3E}">
+        <p14:creationId xmlns:p14="http://schemas.microsoft.com/office/powerpoint/2010/main" val="3029867180"/>
       </p:ext>
     </p:extLst>
   </p:cSld>
@@ -2773,7 +3141,7 @@
           <a:p>
             <a:fld id="{0D8634C2-258F-4C1A-A710-03B98C1D0D54}" type="datetimeFigureOut">
               <a:rPr lang="en-US" smtClean="0"/>
-              <a:t>10/4/2010</a:t>
+              <a:t>10/5/2010</a:t>
             </a:fld>
             <a:endParaRPr lang="en-US"/>
           </a:p>
@@ -3878,7 +4246,7 @@
           <a:p>
             <a:fld id="{0D8634C2-258F-4C1A-A710-03B98C1D0D54}" type="datetimeFigureOut">
               <a:rPr lang="en-US" smtClean="0"/>
-              <a:t>10/4/2010</a:t>
+              <a:t>10/5/2010</a:t>
             </a:fld>
             <a:endParaRPr lang="en-US"/>
           </a:p>
@@ -4991,7 +5359,7 @@
           <a:p>
             <a:fld id="{0D8634C2-258F-4C1A-A710-03B98C1D0D54}" type="datetimeFigureOut">
               <a:rPr lang="en-US" smtClean="0"/>
-              <a:t>10/4/2010</a:t>
+              <a:t>10/5/2010</a:t>
             </a:fld>
             <a:endParaRPr lang="en-US"/>
           </a:p>
@@ -6099,7 +6467,7 @@
           <a:p>
             <a:fld id="{0D8634C2-258F-4C1A-A710-03B98C1D0D54}" type="datetimeFigureOut">
               <a:rPr lang="en-US" smtClean="0"/>
-              <a:t>10/4/2010</a:t>
+              <a:t>10/5/2010</a:t>
             </a:fld>
             <a:endParaRPr lang="en-US"/>
           </a:p>
@@ -7692,7 +8060,7 @@
           <a:p>
             <a:fld id="{0D8634C2-258F-4C1A-A710-03B98C1D0D54}" type="datetimeFigureOut">
               <a:rPr lang="en-US" smtClean="0"/>
-              <a:t>10/4/2010</a:t>
+              <a:t>10/5/2010</a:t>
             </a:fld>
             <a:endParaRPr lang="en-US"/>
           </a:p>
@@ -8750,7 +9118,7 @@
           <a:p>
             <a:fld id="{0D8634C2-258F-4C1A-A710-03B98C1D0D54}" type="datetimeFigureOut">
               <a:rPr lang="en-US" smtClean="0"/>
-              <a:t>10/4/2010</a:t>
+              <a:t>10/5/2010</a:t>
             </a:fld>
             <a:endParaRPr lang="en-US"/>
           </a:p>
@@ -10077,7 +10445,7 @@
           <a:p>
             <a:fld id="{0D8634C2-258F-4C1A-A710-03B98C1D0D54}" type="datetimeFigureOut">
               <a:rPr lang="en-US" smtClean="0"/>
-              <a:t>10/4/2010</a:t>
+              <a:t>10/5/2010</a:t>
             </a:fld>
             <a:endParaRPr lang="en-US"/>
           </a:p>
@@ -11214,7 +11582,7 @@
           <a:p>
             <a:fld id="{0D8634C2-258F-4C1A-A710-03B98C1D0D54}" type="datetimeFigureOut">
               <a:rPr lang="en-US" smtClean="0"/>
-              <a:t>10/4/2010</a:t>
+              <a:t>10/5/2010</a:t>
             </a:fld>
             <a:endParaRPr lang="en-US"/>
           </a:p>
@@ -12270,7 +12638,7 @@
           <a:p>
             <a:fld id="{0D8634C2-258F-4C1A-A710-03B98C1D0D54}" type="datetimeFigureOut">
               <a:rPr lang="en-US" smtClean="0"/>
-              <a:t>10/4/2010</a:t>
+              <a:t>10/5/2010</a:t>
             </a:fld>
             <a:endParaRPr lang="en-US"/>
           </a:p>
@@ -13308,7 +13676,7 @@
           <a:p>
             <a:fld id="{0D8634C2-258F-4C1A-A710-03B98C1D0D54}" type="datetimeFigureOut">
               <a:rPr lang="en-US" smtClean="0"/>
-              <a:t>10/4/2010</a:t>
+              <a:t>10/5/2010</a:t>
             </a:fld>
             <a:endParaRPr lang="en-US"/>
           </a:p>
@@ -14543,7 +14911,7 @@
           <a:p>
             <a:fld id="{0D8634C2-258F-4C1A-A710-03B98C1D0D54}" type="datetimeFigureOut">
               <a:rPr lang="en-US" smtClean="0"/>
-              <a:t>10/4/2010</a:t>
+              <a:t>10/5/2010</a:t>
             </a:fld>
             <a:endParaRPr lang="en-US"/>
           </a:p>
@@ -14896,7 +15264,7 @@
           <a:p>
             <a:fld id="{0D8634C2-258F-4C1A-A710-03B98C1D0D54}" type="datetimeFigureOut">
               <a:rPr lang="en-US" smtClean="0"/>
-              <a:t>10/4/2010</a:t>
+              <a:t>10/5/2010</a:t>
             </a:fld>
             <a:endParaRPr lang="en-US"/>
           </a:p>
@@ -15466,6 +15834,126 @@
       </p:grpSpPr>
       <p:pic>
         <p:nvPicPr>
+          <p:cNvPr id="2" name="Content Placeholder 3"/>
+          <p:cNvPicPr>
+            <a:picLocks noChangeAspect="1"/>
+          </p:cNvPicPr>
+          <p:nvPr/>
+        </p:nvPicPr>
+        <p:blipFill>
+          <a:blip r:embed="rId3">
+            <a:extLst>
+              <a:ext uri="{28A0092B-C50C-407E-A947-70E740481C1C}">
+                <a14:useLocalDpi xmlns:a14="http://schemas.microsoft.com/office/drawing/2010/main" val="0"/>
+              </a:ext>
+            </a:extLst>
+          </a:blip>
+          <a:stretch>
+            <a:fillRect/>
+          </a:stretch>
+        </p:blipFill>
+        <p:spPr>
+          <a:xfrm>
+            <a:off x="66755" y="0"/>
+            <a:ext cx="9001045" cy="6872806"/>
+          </a:xfrm>
+          <a:prstGeom prst="rect">
+            <a:avLst/>
+          </a:prstGeom>
+        </p:spPr>
+      </p:pic>
+    </p:spTree>
+    <p:extLst>
+      <p:ext uri="{BB962C8B-B14F-4D97-AF65-F5344CB8AC3E}">
+        <p14:creationId xmlns:p14="http://schemas.microsoft.com/office/powerpoint/2010/main" val="3124312875"/>
+      </p:ext>
+    </p:extLst>
+  </p:cSld>
+  <p:clrMapOvr>
+    <a:masterClrMapping/>
+  </p:clrMapOvr>
+</p:sld>
+</file>
+
+<file path=ppt/slides/slide11.xml><?xml version="1.0" encoding="utf-8"?>
+<p:sld xmlns:a="http://schemas.openxmlformats.org/drawingml/2006/main" xmlns:r="http://schemas.openxmlformats.org/officeDocument/2006/relationships" xmlns:p="http://schemas.openxmlformats.org/presentationml/2006/main">
+  <p:cSld>
+    <p:spTree>
+      <p:nvGrpSpPr>
+        <p:cNvPr id="1" name=""/>
+        <p:cNvGrpSpPr/>
+        <p:nvPr/>
+      </p:nvGrpSpPr>
+      <p:grpSpPr>
+        <a:xfrm>
+          <a:off x="0" y="0"/>
+          <a:ext cx="0" cy="0"/>
+          <a:chOff x="0" y="0"/>
+          <a:chExt cx="0" cy="0"/>
+        </a:xfrm>
+      </p:grpSpPr>
+      <p:pic>
+        <p:nvPicPr>
+          <p:cNvPr id="2" name="Picture 1"/>
+          <p:cNvPicPr>
+            <a:picLocks noChangeAspect="1"/>
+          </p:cNvPicPr>
+          <p:nvPr/>
+        </p:nvPicPr>
+        <p:blipFill>
+          <a:blip r:embed="rId3">
+            <a:extLst>
+              <a:ext uri="{28A0092B-C50C-407E-A947-70E740481C1C}">
+                <a14:useLocalDpi xmlns:a14="http://schemas.microsoft.com/office/drawing/2010/main" val="0"/>
+              </a:ext>
+            </a:extLst>
+          </a:blip>
+          <a:stretch>
+            <a:fillRect/>
+          </a:stretch>
+        </p:blipFill>
+        <p:spPr>
+          <a:xfrm>
+            <a:off x="0" y="1666188"/>
+            <a:ext cx="9144000" cy="3525624"/>
+          </a:xfrm>
+          <a:prstGeom prst="rect">
+            <a:avLst/>
+          </a:prstGeom>
+        </p:spPr>
+      </p:pic>
+    </p:spTree>
+    <p:extLst>
+      <p:ext uri="{BB962C8B-B14F-4D97-AF65-F5344CB8AC3E}">
+        <p14:creationId xmlns:p14="http://schemas.microsoft.com/office/powerpoint/2010/main" val="2921490114"/>
+      </p:ext>
+    </p:extLst>
+  </p:cSld>
+  <p:clrMapOvr>
+    <a:masterClrMapping/>
+  </p:clrMapOvr>
+</p:sld>
+</file>
+
+<file path=ppt/slides/slide12.xml><?xml version="1.0" encoding="utf-8"?>
+<p:sld xmlns:a="http://schemas.openxmlformats.org/drawingml/2006/main" xmlns:r="http://schemas.openxmlformats.org/officeDocument/2006/relationships" xmlns:p="http://schemas.openxmlformats.org/presentationml/2006/main">
+  <p:cSld>
+    <p:spTree>
+      <p:nvGrpSpPr>
+        <p:cNvPr id="1" name=""/>
+        <p:cNvGrpSpPr/>
+        <p:nvPr/>
+      </p:nvGrpSpPr>
+      <p:grpSpPr>
+        <a:xfrm>
+          <a:off x="0" y="0"/>
+          <a:ext cx="0" cy="0"/>
+          <a:chOff x="0" y="0"/>
+          <a:chExt cx="0" cy="0"/>
+        </a:xfrm>
+      </p:grpSpPr>
+      <p:pic>
+        <p:nvPicPr>
           <p:cNvPr id="2" name="Picture 1"/>
           <p:cNvPicPr>
             <a:picLocks noChangeAspect="1"/>
@@ -15507,7 +15995,7 @@
 </p:sld>
 </file>
 
-<file path=ppt/slides/slide11.xml><?xml version="1.0" encoding="utf-8"?>
+<file path=ppt/slides/slide13.xml><?xml version="1.0" encoding="utf-8"?>
 <p:sld xmlns:a="http://schemas.openxmlformats.org/drawingml/2006/main" xmlns:r="http://schemas.openxmlformats.org/officeDocument/2006/relationships" xmlns:p="http://schemas.openxmlformats.org/presentationml/2006/main">
   <p:cSld>
     <p:spTree>
@@ -15567,7 +16055,7 @@
 </p:sld>
 </file>
 
-<file path=ppt/slides/slide12.xml><?xml version="1.0" encoding="utf-8"?>
+<file path=ppt/slides/slide14.xml><?xml version="1.0" encoding="utf-8"?>
 <p:sld xmlns:a="http://schemas.openxmlformats.org/drawingml/2006/main" xmlns:r="http://schemas.openxmlformats.org/officeDocument/2006/relationships" xmlns:p="http://schemas.openxmlformats.org/presentationml/2006/main">
   <p:cSld>
     <p:spTree>
@@ -15634,7 +16122,7 @@
 </p:sld>
 </file>
 
-<file path=ppt/slides/slide13.xml><?xml version="1.0" encoding="utf-8"?>
+<file path=ppt/slides/slide15.xml><?xml version="1.0" encoding="utf-8"?>
 <p:sld xmlns:a="http://schemas.openxmlformats.org/drawingml/2006/main" xmlns:r="http://schemas.openxmlformats.org/officeDocument/2006/relationships" xmlns:p="http://schemas.openxmlformats.org/presentationml/2006/main">
   <p:cSld>
     <p:spTree>
@@ -15701,7 +16189,7 @@
 </p:sld>
 </file>
 
-<file path=ppt/slides/slide14.xml><?xml version="1.0" encoding="utf-8"?>
+<file path=ppt/slides/slide16.xml><?xml version="1.0" encoding="utf-8"?>
 <p:sld xmlns:a="http://schemas.openxmlformats.org/drawingml/2006/main" xmlns:r="http://schemas.openxmlformats.org/officeDocument/2006/relationships" xmlns:p="http://schemas.openxmlformats.org/presentationml/2006/main">
   <p:cSld>
     <p:spTree>
@@ -16473,7 +16961,7 @@
       </p:grpSpPr>
       <p:sp>
         <p:nvSpPr>
-          <p:cNvPr id="4" name="Title 3"/>
+          <p:cNvPr id="2" name="Title 1"/>
           <p:cNvSpPr>
             <a:spLocks noGrp="1"/>
           </p:cNvSpPr>
@@ -16488,7 +16976,121 @@
           <a:p>
             <a:r>
               <a:rPr lang="en-US" dirty="0" smtClean="0"/>
-              <a:t>Browser compatibility</a:t>
+              <a:t>Local Storage</a:t>
+            </a:r>
+            <a:endParaRPr lang="en-US" dirty="0"/>
+          </a:p>
+        </p:txBody>
+      </p:sp>
+      <p:sp>
+        <p:nvSpPr>
+          <p:cNvPr id="3" name="Content Placeholder 2"/>
+          <p:cNvSpPr>
+            <a:spLocks noGrp="1"/>
+          </p:cNvSpPr>
+          <p:nvPr>
+            <p:ph idx="1"/>
+          </p:nvPr>
+        </p:nvSpPr>
+        <p:spPr/>
+        <p:txBody>
+          <a:bodyPr/>
+          <a:lstStyle/>
+          <a:p>
+            <a:r>
+              <a:rPr lang="en-US" dirty="0"/>
+              <a:t>B</a:t>
+            </a:r>
+            <a:r>
+              <a:rPr lang="en-US" dirty="0" smtClean="0"/>
+              <a:t>ased </a:t>
+            </a:r>
+            <a:r>
+              <a:rPr lang="en-US" dirty="0"/>
+              <a:t>on named key/value </a:t>
+            </a:r>
+            <a:r>
+              <a:rPr lang="en-US" dirty="0" smtClean="0"/>
+              <a:t>pairs</a:t>
+            </a:r>
+          </a:p>
+          <a:p>
+            <a:pPr lvl="1"/>
+            <a:r>
+              <a:rPr lang="pt-BR" dirty="0" smtClean="0"/>
+              <a:t>var </a:t>
+            </a:r>
+            <a:r>
+              <a:rPr lang="pt-BR" dirty="0"/>
+              <a:t>foo = localStorage.getItem("bar"); </a:t>
+            </a:r>
+            <a:endParaRPr lang="pt-BR" dirty="0" smtClean="0"/>
+          </a:p>
+          <a:p>
+            <a:pPr lvl="1"/>
+            <a:r>
+              <a:rPr lang="pt-BR" dirty="0" smtClean="0"/>
+              <a:t>// </a:t>
+            </a:r>
+            <a:r>
+              <a:rPr lang="pt-BR" dirty="0"/>
+              <a:t>... </a:t>
+            </a:r>
+            <a:endParaRPr lang="pt-BR" dirty="0" smtClean="0"/>
+          </a:p>
+          <a:p>
+            <a:pPr lvl="1"/>
+            <a:r>
+              <a:rPr lang="pt-BR" dirty="0" smtClean="0"/>
+              <a:t>localStorage.setItem</a:t>
+            </a:r>
+            <a:r>
+              <a:rPr lang="pt-BR" dirty="0"/>
+              <a:t>("bar", foo</a:t>
+            </a:r>
+            <a:r>
+              <a:rPr lang="pt-BR" dirty="0" smtClean="0"/>
+              <a:t>);</a:t>
+            </a:r>
+          </a:p>
+          <a:p>
+            <a:r>
+              <a:rPr lang="en-US" dirty="0" smtClean="0"/>
+              <a:t>5 MB local storage - QUOTA_EXCEEDED_ERR if you exceed</a:t>
+            </a:r>
+          </a:p>
+          <a:p>
+            <a:r>
+              <a:rPr lang="en-US" dirty="0" smtClean="0"/>
+              <a:t>No </a:t>
+            </a:r>
+            <a:r>
+              <a:rPr lang="en-US" dirty="0"/>
+              <a:t>browser supports </a:t>
+            </a:r>
+            <a:r>
+              <a:rPr lang="en-US" dirty="0" smtClean="0"/>
+              <a:t>for </a:t>
+            </a:r>
+            <a:r>
+              <a:rPr lang="en-US" dirty="0"/>
+              <a:t>web developers to request more storage </a:t>
+            </a:r>
+            <a:r>
+              <a:rPr lang="en-US" dirty="0" smtClean="0"/>
+              <a:t>space</a:t>
+            </a:r>
+          </a:p>
+          <a:p>
+            <a:r>
+              <a:rPr lang="en-US" dirty="0" smtClean="0"/>
+              <a:t>Everything is stored as Strings</a:t>
+            </a:r>
+          </a:p>
+          <a:p>
+            <a:r>
+              <a:rPr lang="en-US" dirty="0" smtClean="0"/>
+              <a:t>Compatible with iPhone 2.0+ and Android 2.0+</a:t>
             </a:r>
             <a:endParaRPr lang="en-US" dirty="0"/>
           </a:p>
@@ -16497,7 +17099,7 @@
     </p:spTree>
     <p:extLst>
       <p:ext uri="{BB962C8B-B14F-4D97-AF65-F5344CB8AC3E}">
-        <p14:creationId xmlns:p14="http://schemas.microsoft.com/office/powerpoint/2010/main" val="3211164626"/>
+        <p14:creationId xmlns:p14="http://schemas.microsoft.com/office/powerpoint/2010/main" val="1114856123"/>
       </p:ext>
     </p:extLst>
   </p:cSld>
@@ -16524,40 +17126,85 @@
           <a:chExt cx="0" cy="0"/>
         </a:xfrm>
       </p:grpSpPr>
-      <p:pic>
-        <p:nvPicPr>
-          <p:cNvPr id="2" name="Content Placeholder 3"/>
-          <p:cNvPicPr>
-            <a:picLocks noChangeAspect="1"/>
-          </p:cNvPicPr>
-          <p:nvPr/>
-        </p:nvPicPr>
-        <p:blipFill>
-          <a:blip r:embed="rId3">
-            <a:extLst>
-              <a:ext uri="{28A0092B-C50C-407E-A947-70E740481C1C}">
-                <a14:useLocalDpi xmlns:a14="http://schemas.microsoft.com/office/drawing/2010/main" val="0"/>
-              </a:ext>
-            </a:extLst>
-          </a:blip>
-          <a:stretch>
-            <a:fillRect/>
-          </a:stretch>
-        </p:blipFill>
-        <p:spPr>
-          <a:xfrm>
-            <a:off x="66755" y="0"/>
-            <a:ext cx="9001045" cy="6872806"/>
-          </a:xfrm>
-          <a:prstGeom prst="rect">
-            <a:avLst/>
-          </a:prstGeom>
-        </p:spPr>
-      </p:pic>
+      <p:sp>
+        <p:nvSpPr>
+          <p:cNvPr id="2" name="Title 1"/>
+          <p:cNvSpPr>
+            <a:spLocks noGrp="1"/>
+          </p:cNvSpPr>
+          <p:nvPr>
+            <p:ph type="title"/>
+          </p:nvPr>
+        </p:nvSpPr>
+        <p:spPr/>
+        <p:txBody>
+          <a:bodyPr/>
+          <a:lstStyle/>
+          <a:p>
+            <a:r>
+              <a:rPr lang="en-US" dirty="0" smtClean="0"/>
+              <a:t>Offline Applications</a:t>
+            </a:r>
+            <a:endParaRPr lang="en-US" dirty="0"/>
+          </a:p>
+        </p:txBody>
+      </p:sp>
+      <p:sp>
+        <p:nvSpPr>
+          <p:cNvPr id="3" name="Content Placeholder 2"/>
+          <p:cNvSpPr>
+            <a:spLocks noGrp="1"/>
+          </p:cNvSpPr>
+          <p:nvPr>
+            <p:ph idx="1"/>
+          </p:nvPr>
+        </p:nvSpPr>
+        <p:spPr/>
+        <p:txBody>
+          <a:bodyPr/>
+          <a:lstStyle/>
+          <a:p>
+            <a:r>
+              <a:rPr lang="en-US" dirty="0" smtClean="0"/>
+              <a:t>A web application can point to a list of URLs that will be downloaded and cached locally for offline use</a:t>
+            </a:r>
+          </a:p>
+          <a:p>
+            <a:r>
+              <a:rPr lang="en-US" dirty="0" smtClean="0"/>
+              <a:t>Changes over to local copies when offline</a:t>
+            </a:r>
+          </a:p>
+          <a:p>
+            <a:r>
+              <a:rPr lang="en-US" dirty="0" smtClean="0"/>
+              <a:t>Uses local storage for saving state or creating data</a:t>
+            </a:r>
+          </a:p>
+          <a:p>
+            <a:pPr lvl="1"/>
+            <a:r>
+              <a:rPr lang="en-US" dirty="0" smtClean="0"/>
+              <a:t>Developer has to synchronize the information in the local storage if need be</a:t>
+            </a:r>
+          </a:p>
+          <a:p>
+            <a:r>
+              <a:rPr lang="en-US" dirty="0"/>
+              <a:t>Compatible with iPhone </a:t>
+            </a:r>
+            <a:r>
+              <a:rPr lang="en-US" dirty="0" smtClean="0"/>
+              <a:t>and Android</a:t>
+            </a:r>
+            <a:endParaRPr lang="en-US" dirty="0"/>
+          </a:p>
+        </p:txBody>
+      </p:sp>
     </p:spTree>
     <p:extLst>
       <p:ext uri="{BB962C8B-B14F-4D97-AF65-F5344CB8AC3E}">
-        <p14:creationId xmlns:p14="http://schemas.microsoft.com/office/powerpoint/2010/main" val="3124312875"/>
+        <p14:creationId xmlns:p14="http://schemas.microsoft.com/office/powerpoint/2010/main" val="3146314625"/>
       </p:ext>
     </p:extLst>
   </p:cSld>
@@ -16584,40 +17231,33 @@
           <a:chExt cx="0" cy="0"/>
         </a:xfrm>
       </p:grpSpPr>
-      <p:pic>
-        <p:nvPicPr>
-          <p:cNvPr id="2" name="Picture 1"/>
-          <p:cNvPicPr>
-            <a:picLocks noChangeAspect="1"/>
-          </p:cNvPicPr>
-          <p:nvPr/>
-        </p:nvPicPr>
-        <p:blipFill>
-          <a:blip r:embed="rId3">
-            <a:extLst>
-              <a:ext uri="{28A0092B-C50C-407E-A947-70E740481C1C}">
-                <a14:useLocalDpi xmlns:a14="http://schemas.microsoft.com/office/drawing/2010/main" val="0"/>
-              </a:ext>
-            </a:extLst>
-          </a:blip>
-          <a:stretch>
-            <a:fillRect/>
-          </a:stretch>
-        </p:blipFill>
-        <p:spPr>
-          <a:xfrm>
-            <a:off x="0" y="1666188"/>
-            <a:ext cx="9144000" cy="3525624"/>
-          </a:xfrm>
-          <a:prstGeom prst="rect">
-            <a:avLst/>
-          </a:prstGeom>
-        </p:spPr>
-      </p:pic>
+      <p:sp>
+        <p:nvSpPr>
+          <p:cNvPr id="4" name="Title 3"/>
+          <p:cNvSpPr>
+            <a:spLocks noGrp="1"/>
+          </p:cNvSpPr>
+          <p:nvPr>
+            <p:ph type="title"/>
+          </p:nvPr>
+        </p:nvSpPr>
+        <p:spPr/>
+        <p:txBody>
+          <a:bodyPr/>
+          <a:lstStyle/>
+          <a:p>
+            <a:r>
+              <a:rPr lang="en-US" dirty="0" smtClean="0"/>
+              <a:t>Browser compatibility</a:t>
+            </a:r>
+            <a:endParaRPr lang="en-US" dirty="0"/>
+          </a:p>
+        </p:txBody>
+      </p:sp>
     </p:spTree>
     <p:extLst>
       <p:ext uri="{BB962C8B-B14F-4D97-AF65-F5344CB8AC3E}">
-        <p14:creationId xmlns:p14="http://schemas.microsoft.com/office/powerpoint/2010/main" val="2921490114"/>
+        <p14:creationId xmlns:p14="http://schemas.microsoft.com/office/powerpoint/2010/main" val="3211164626"/>
       </p:ext>
     </p:extLst>
   </p:cSld>

</xml_diff>

<commit_message>
added arcade fire video to demos
</commit_message>
<xml_diff>
--- a/HTML 5.pptx
+++ b/HTML 5.pptx
@@ -216,7 +216,7 @@
             <a:fld id="{37BA4401-E857-4CEC-9D7B-FB4EC38016BB}" type="datetimeFigureOut">
               <a:rPr lang="en-US" smtClean="0"/>
               <a:pPr/>
-              <a:t>10/5/2010</a:t>
+              <a:t>10/6/2010</a:t>
             </a:fld>
             <a:endParaRPr lang="en-US"/>
           </a:p>
@@ -385,7 +385,7 @@
     </p:spTree>
     <p:extLst>
       <p:ext uri="{BB962C8B-B14F-4D97-AF65-F5344CB8AC3E}">
-        <p14:creationId xmlns:p14="http://schemas.microsoft.com/office/powerpoint/2010/main" xmlns="" val="3199150606"/>
+        <p14:creationId xmlns="" xmlns:p14="http://schemas.microsoft.com/office/powerpoint/2010/main" val="3199150606"/>
       </p:ext>
     </p:extLst>
   </p:cSld>
@@ -568,7 +568,7 @@
     </p:spTree>
     <p:extLst>
       <p:ext uri="{BB962C8B-B14F-4D97-AF65-F5344CB8AC3E}">
-        <p14:creationId xmlns:p14="http://schemas.microsoft.com/office/powerpoint/2010/main" xmlns="" val="1708360401"/>
+        <p14:creationId xmlns="" xmlns:p14="http://schemas.microsoft.com/office/powerpoint/2010/main" val="1708360401"/>
       </p:ext>
     </p:extLst>
   </p:cSld>
@@ -665,7 +665,7 @@
     </p:spTree>
     <p:extLst>
       <p:ext uri="{BB962C8B-B14F-4D97-AF65-F5344CB8AC3E}">
-        <p14:creationId xmlns:p14="http://schemas.microsoft.com/office/powerpoint/2010/main" xmlns="" val="940200116"/>
+        <p14:creationId xmlns="" xmlns:p14="http://schemas.microsoft.com/office/powerpoint/2010/main" val="940200116"/>
       </p:ext>
     </p:extLst>
   </p:cSld>
@@ -936,7 +936,7 @@
     </p:spTree>
     <p:extLst>
       <p:ext uri="{BB962C8B-B14F-4D97-AF65-F5344CB8AC3E}">
-        <p14:creationId xmlns:p14="http://schemas.microsoft.com/office/powerpoint/2010/main" xmlns="" val="1547011357"/>
+        <p14:creationId xmlns="" xmlns:p14="http://schemas.microsoft.com/office/powerpoint/2010/main" val="1547011357"/>
       </p:ext>
     </p:extLst>
   </p:cSld>
@@ -1033,7 +1033,7 @@
     </p:spTree>
     <p:extLst>
       <p:ext uri="{BB962C8B-B14F-4D97-AF65-F5344CB8AC3E}">
-        <p14:creationId xmlns:p14="http://schemas.microsoft.com/office/powerpoint/2010/main" xmlns="" val="517990324"/>
+        <p14:creationId xmlns="" xmlns:p14="http://schemas.microsoft.com/office/powerpoint/2010/main" val="517990324"/>
       </p:ext>
     </p:extLst>
   </p:cSld>
@@ -1132,7 +1132,7 @@
     </p:spTree>
     <p:extLst>
       <p:ext uri="{BB962C8B-B14F-4D97-AF65-F5344CB8AC3E}">
-        <p14:creationId xmlns:p14="http://schemas.microsoft.com/office/powerpoint/2010/main" xmlns="" val="2088620080"/>
+        <p14:creationId xmlns="" xmlns:p14="http://schemas.microsoft.com/office/powerpoint/2010/main" val="2088620080"/>
       </p:ext>
     </p:extLst>
   </p:cSld>
@@ -1225,7 +1225,7 @@
     </p:spTree>
     <p:extLst>
       <p:ext uri="{BB962C8B-B14F-4D97-AF65-F5344CB8AC3E}">
-        <p14:creationId xmlns:p14="http://schemas.microsoft.com/office/powerpoint/2010/main" xmlns="" val="3968686592"/>
+        <p14:creationId xmlns="" xmlns:p14="http://schemas.microsoft.com/office/powerpoint/2010/main" val="3968686592"/>
       </p:ext>
     </p:extLst>
   </p:cSld>
@@ -1326,7 +1326,7 @@
     </p:spTree>
     <p:extLst>
       <p:ext uri="{BB962C8B-B14F-4D97-AF65-F5344CB8AC3E}">
-        <p14:creationId xmlns:p14="http://schemas.microsoft.com/office/powerpoint/2010/main" xmlns="" val="837441399"/>
+        <p14:creationId xmlns="" xmlns:p14="http://schemas.microsoft.com/office/powerpoint/2010/main" val="837441399"/>
       </p:ext>
     </p:extLst>
   </p:cSld>
@@ -1419,7 +1419,7 @@
     </p:spTree>
     <p:extLst>
       <p:ext uri="{BB962C8B-B14F-4D97-AF65-F5344CB8AC3E}">
-        <p14:creationId xmlns:p14="http://schemas.microsoft.com/office/powerpoint/2010/main" xmlns="" val="3993395543"/>
+        <p14:creationId xmlns="" xmlns:p14="http://schemas.microsoft.com/office/powerpoint/2010/main" val="3993395543"/>
       </p:ext>
     </p:extLst>
   </p:cSld>
@@ -1520,7 +1520,7 @@
     </p:spTree>
     <p:extLst>
       <p:ext uri="{BB962C8B-B14F-4D97-AF65-F5344CB8AC3E}">
-        <p14:creationId xmlns:p14="http://schemas.microsoft.com/office/powerpoint/2010/main" xmlns="" val="2740929555"/>
+        <p14:creationId xmlns="" xmlns:p14="http://schemas.microsoft.com/office/powerpoint/2010/main" val="2740929555"/>
       </p:ext>
     </p:extLst>
   </p:cSld>
@@ -1613,7 +1613,7 @@
     </p:spTree>
     <p:extLst>
       <p:ext uri="{BB962C8B-B14F-4D97-AF65-F5344CB8AC3E}">
-        <p14:creationId xmlns:p14="http://schemas.microsoft.com/office/powerpoint/2010/main" xmlns="" val="3029867180"/>
+        <p14:creationId xmlns="" xmlns:p14="http://schemas.microsoft.com/office/powerpoint/2010/main" val="3029867180"/>
       </p:ext>
     </p:extLst>
   </p:cSld>
@@ -3162,7 +3162,7 @@
             <a:fld id="{0D8634C2-258F-4C1A-A710-03B98C1D0D54}" type="datetimeFigureOut">
               <a:rPr lang="en-US" smtClean="0"/>
               <a:pPr/>
-              <a:t>10/5/2010</a:t>
+              <a:t>10/6/2010</a:t>
             </a:fld>
             <a:endParaRPr lang="en-US"/>
           </a:p>
@@ -4269,7 +4269,7 @@
             <a:fld id="{0D8634C2-258F-4C1A-A710-03B98C1D0D54}" type="datetimeFigureOut">
               <a:rPr lang="en-US" smtClean="0"/>
               <a:pPr/>
-              <a:t>10/5/2010</a:t>
+              <a:t>10/6/2010</a:t>
             </a:fld>
             <a:endParaRPr lang="en-US"/>
           </a:p>
@@ -5384,7 +5384,7 @@
             <a:fld id="{0D8634C2-258F-4C1A-A710-03B98C1D0D54}" type="datetimeFigureOut">
               <a:rPr lang="en-US" smtClean="0"/>
               <a:pPr/>
-              <a:t>10/5/2010</a:t>
+              <a:t>10/6/2010</a:t>
             </a:fld>
             <a:endParaRPr lang="en-US"/>
           </a:p>
@@ -6494,7 +6494,7 @@
             <a:fld id="{0D8634C2-258F-4C1A-A710-03B98C1D0D54}" type="datetimeFigureOut">
               <a:rPr lang="en-US" smtClean="0"/>
               <a:pPr/>
-              <a:t>10/5/2010</a:t>
+              <a:t>10/6/2010</a:t>
             </a:fld>
             <a:endParaRPr lang="en-US"/>
           </a:p>
@@ -8089,7 +8089,7 @@
             <a:fld id="{0D8634C2-258F-4C1A-A710-03B98C1D0D54}" type="datetimeFigureOut">
               <a:rPr lang="en-US" smtClean="0"/>
               <a:pPr/>
-              <a:t>10/5/2010</a:t>
+              <a:t>10/6/2010</a:t>
             </a:fld>
             <a:endParaRPr lang="en-US"/>
           </a:p>
@@ -9149,7 +9149,7 @@
             <a:fld id="{0D8634C2-258F-4C1A-A710-03B98C1D0D54}" type="datetimeFigureOut">
               <a:rPr lang="en-US" smtClean="0"/>
               <a:pPr/>
-              <a:t>10/5/2010</a:t>
+              <a:t>10/6/2010</a:t>
             </a:fld>
             <a:endParaRPr lang="en-US"/>
           </a:p>
@@ -10478,7 +10478,7 @@
             <a:fld id="{0D8634C2-258F-4C1A-A710-03B98C1D0D54}" type="datetimeFigureOut">
               <a:rPr lang="en-US" smtClean="0"/>
               <a:pPr/>
-              <a:t>10/5/2010</a:t>
+              <a:t>10/6/2010</a:t>
             </a:fld>
             <a:endParaRPr lang="en-US"/>
           </a:p>
@@ -11617,7 +11617,7 @@
             <a:fld id="{0D8634C2-258F-4C1A-A710-03B98C1D0D54}" type="datetimeFigureOut">
               <a:rPr lang="en-US" smtClean="0"/>
               <a:pPr/>
-              <a:t>10/5/2010</a:t>
+              <a:t>10/6/2010</a:t>
             </a:fld>
             <a:endParaRPr lang="en-US"/>
           </a:p>
@@ -12675,7 +12675,7 @@
             <a:fld id="{0D8634C2-258F-4C1A-A710-03B98C1D0D54}" type="datetimeFigureOut">
               <a:rPr lang="en-US" smtClean="0"/>
               <a:pPr/>
-              <a:t>10/5/2010</a:t>
+              <a:t>10/6/2010</a:t>
             </a:fld>
             <a:endParaRPr lang="en-US"/>
           </a:p>
@@ -13715,7 +13715,7 @@
             <a:fld id="{0D8634C2-258F-4C1A-A710-03B98C1D0D54}" type="datetimeFigureOut">
               <a:rPr lang="en-US" smtClean="0"/>
               <a:pPr/>
-              <a:t>10/5/2010</a:t>
+              <a:t>10/6/2010</a:t>
             </a:fld>
             <a:endParaRPr lang="en-US"/>
           </a:p>
@@ -14952,7 +14952,7 @@
             <a:fld id="{0D8634C2-258F-4C1A-A710-03B98C1D0D54}" type="datetimeFigureOut">
               <a:rPr lang="en-US" smtClean="0"/>
               <a:pPr/>
-              <a:t>10/5/2010</a:t>
+              <a:t>10/6/2010</a:t>
             </a:fld>
             <a:endParaRPr lang="en-US"/>
           </a:p>
@@ -15307,7 +15307,7 @@
             <a:fld id="{0D8634C2-258F-4C1A-A710-03B98C1D0D54}" type="datetimeFigureOut">
               <a:rPr lang="en-US" smtClean="0"/>
               <a:pPr/>
-              <a:t>10/5/2010</a:t>
+              <a:t>10/6/2010</a:t>
             </a:fld>
             <a:endParaRPr lang="en-US"/>
           </a:p>
@@ -15849,7 +15849,7 @@
     </p:spTree>
     <p:extLst>
       <p:ext uri="{BB962C8B-B14F-4D97-AF65-F5344CB8AC3E}">
-        <p14:creationId xmlns:p14="http://schemas.microsoft.com/office/powerpoint/2010/main" xmlns="" val="2539206010"/>
+        <p14:creationId xmlns="" xmlns:p14="http://schemas.microsoft.com/office/powerpoint/2010/main" val="2539206010"/>
       </p:ext>
     </p:extLst>
   </p:cSld>
@@ -15933,11 +15933,7 @@
             </a:r>
             <a:r>
               <a:rPr lang="en-US" dirty="0" err="1" smtClean="0"/>
-              <a:t>G</a:t>
-            </a:r>
-            <a:r>
-              <a:rPr lang="en-US" dirty="0" err="1" smtClean="0"/>
-              <a:t>eolocation</a:t>
+              <a:t>Geolocation</a:t>
             </a:r>
             <a:r>
               <a:rPr lang="en-US" dirty="0" smtClean="0"/>
@@ -15984,13 +15980,7 @@
               <a:rPr lang="en-US" sz="2000" dirty="0" smtClean="0">
                 <a:hlinkClick r:id="rId2"/>
               </a:rPr>
-              <a:t>http://slides.html5rocks.com/#</a:t>
-            </a:r>
-            <a:r>
-              <a:rPr lang="en-US" sz="2000" dirty="0" smtClean="0">
-                <a:hlinkClick r:id="rId2"/>
-              </a:rPr>
-              <a:t>slide14</a:t>
+              <a:t>http://slides.html5rocks.com/#slide14</a:t>
             </a:r>
             <a:endParaRPr lang="en-US" sz="2000" dirty="0" smtClean="0"/>
           </a:p>
@@ -16095,13 +16085,7 @@
               <a:rPr lang="en-US" sz="2000" dirty="0" smtClean="0">
                 <a:hlinkClick r:id="rId2"/>
               </a:rPr>
-              <a:t>http://slides.html5rocks.com/#</a:t>
-            </a:r>
-            <a:r>
-              <a:rPr lang="en-US" sz="2000" dirty="0" smtClean="0">
-                <a:hlinkClick r:id="rId2"/>
-              </a:rPr>
-              <a:t>slide13</a:t>
+              <a:t>http://slides.html5rocks.com/#slide13</a:t>
             </a:r>
             <a:endParaRPr lang="en-US" sz="2000" dirty="0" smtClean="0"/>
           </a:p>
@@ -16179,11 +16163,7 @@
             <a:pPr lvl="1"/>
             <a:r>
               <a:rPr lang="en-US" dirty="0" smtClean="0"/>
-              <a:t>t</a:t>
-            </a:r>
-            <a:r>
-              <a:rPr lang="en-US" dirty="0" smtClean="0"/>
-              <a:t>ext, password, radio, checkbox, submit</a:t>
+              <a:t>text, password, radio, checkbox, submit</a:t>
             </a:r>
           </a:p>
           <a:p>
@@ -16236,13 +16216,7 @@
               <a:rPr lang="en-US" dirty="0" smtClean="0">
                 <a:hlinkClick r:id="rId3"/>
               </a:rPr>
-              <a:t>http</a:t>
-            </a:r>
-            <a:r>
-              <a:rPr lang="en-US" dirty="0" smtClean="0">
-                <a:hlinkClick r:id="rId3"/>
-              </a:rPr>
-              <a:t>://slides.html5rocks.com/#slide21</a:t>
+              <a:t>http://slides.html5rocks.com/#slide21</a:t>
             </a:r>
             <a:r>
               <a:rPr lang="en-US" dirty="0" smtClean="0"/>
@@ -16377,25 +16351,12 @@
               <a:rPr lang="en-US" dirty="0" smtClean="0"/>
               <a:t>/Person"&gt;</a:t>
             </a:r>
-            <a:endParaRPr lang="en-US" dirty="0" smtClean="0"/>
           </a:p>
           <a:p>
             <a:pPr lvl="1"/>
             <a:r>
               <a:rPr lang="pt-BR" dirty="0" smtClean="0"/>
-              <a:t>&lt;h1 itemprop="name</a:t>
-            </a:r>
-            <a:r>
-              <a:rPr lang="pt-BR" dirty="0" smtClean="0"/>
-              <a:t>"&gt;David Marron&lt;/</a:t>
-            </a:r>
-            <a:r>
-              <a:rPr lang="pt-BR" dirty="0" smtClean="0"/>
-              <a:t>h1</a:t>
-            </a:r>
-            <a:r>
-              <a:rPr lang="pt-BR" dirty="0" smtClean="0"/>
-              <a:t>&gt;</a:t>
+              <a:t>&lt;h1 itemprop="name"&gt;David Marron&lt;/h1&gt;</a:t>
             </a:r>
           </a:p>
           <a:p>
@@ -16447,11 +16408,7 @@
             <a:pPr lvl="1"/>
             <a:r>
               <a:rPr lang="fr-FR" dirty="0" smtClean="0"/>
-              <a:t>&lt;article itemscope itemtype="http://data-vocabulary.org/Event</a:t>
-            </a:r>
-            <a:r>
-              <a:rPr lang="fr-FR" dirty="0" smtClean="0"/>
-              <a:t>"&gt;</a:t>
+              <a:t>&lt;article itemscope itemtype="http://data-vocabulary.org/Event"&gt;</a:t>
             </a:r>
           </a:p>
           <a:p>
@@ -16466,19 +16423,7 @@
             </a:r>
             <a:r>
               <a:rPr lang="en-US" dirty="0" smtClean="0"/>
-              <a:t>="summary</a:t>
-            </a:r>
-            <a:r>
-              <a:rPr lang="en-US" dirty="0" smtClean="0"/>
-              <a:t>"&gt;HTML5 Presentation&lt;/</a:t>
-            </a:r>
-            <a:r>
-              <a:rPr lang="en-US" dirty="0" smtClean="0"/>
-              <a:t>h1</a:t>
-            </a:r>
-            <a:r>
-              <a:rPr lang="en-US" dirty="0" smtClean="0"/>
-              <a:t>&gt;</a:t>
+              <a:t>="summary"&gt;HTML5 Presentation&lt;/h1&gt;</a:t>
             </a:r>
           </a:p>
           <a:p>
@@ -16493,11 +16438,7 @@
             </a:r>
             <a:r>
               <a:rPr lang="en-US" dirty="0" smtClean="0"/>
-              <a:t>=“Date</a:t>
-            </a:r>
-            <a:r>
-              <a:rPr lang="en-US" dirty="0" smtClean="0"/>
-              <a:t>" </a:t>
+              <a:t>=“Date" </a:t>
             </a:r>
             <a:r>
               <a:rPr lang="en-US" dirty="0" err="1" smtClean="0"/>
@@ -16505,17 +16446,8 @@
             </a:r>
             <a:r>
               <a:rPr lang="en-US" dirty="0" smtClean="0"/>
-              <a:t>="</a:t>
-            </a:r>
-            <a:r>
-              <a:rPr lang="en-US" dirty="0" smtClean="0"/>
-              <a:t>2010-10-06"&gt;October 6, 2010&lt;/</a:t>
-            </a:r>
-            <a:r>
-              <a:rPr lang="en-US" dirty="0" smtClean="0"/>
-              <a:t>time&gt;</a:t>
-            </a:r>
-            <a:endParaRPr lang="en-US" dirty="0" smtClean="0"/>
+              <a:t>="2010-10-06"&gt;October 6, 2010&lt;/time&gt;</a:t>
+            </a:r>
           </a:p>
           <a:p>
             <a:r>
@@ -16529,7 +16461,6 @@
               <a:rPr lang="en-US" dirty="0" smtClean="0"/>
               <a:t>HTML5 DOM API</a:t>
             </a:r>
-            <a:endParaRPr lang="en-US" dirty="0" smtClean="0"/>
           </a:p>
           <a:p>
             <a:pPr lvl="1"/>
@@ -16706,7 +16637,7 @@
     </p:spTree>
     <p:extLst>
       <p:ext uri="{BB962C8B-B14F-4D97-AF65-F5344CB8AC3E}">
-        <p14:creationId xmlns:p14="http://schemas.microsoft.com/office/powerpoint/2010/main" xmlns="" val="1114856123"/>
+        <p14:creationId xmlns="" xmlns:p14="http://schemas.microsoft.com/office/powerpoint/2010/main" val="1114856123"/>
       </p:ext>
     </p:extLst>
   </p:cSld>
@@ -16818,7 +16749,7 @@
     </p:spTree>
     <p:extLst>
       <p:ext uri="{BB962C8B-B14F-4D97-AF65-F5344CB8AC3E}">
-        <p14:creationId xmlns:p14="http://schemas.microsoft.com/office/powerpoint/2010/main" xmlns="" val="3146314625"/>
+        <p14:creationId xmlns="" xmlns:p14="http://schemas.microsoft.com/office/powerpoint/2010/main" val="3146314625"/>
       </p:ext>
     </p:extLst>
   </p:cSld>
@@ -16878,7 +16809,7 @@
     </p:spTree>
     <p:extLst>
       <p:ext uri="{BB962C8B-B14F-4D97-AF65-F5344CB8AC3E}">
-        <p14:creationId xmlns:p14="http://schemas.microsoft.com/office/powerpoint/2010/main" xmlns="" val="3211164626"/>
+        <p14:creationId xmlns="" xmlns:p14="http://schemas.microsoft.com/office/powerpoint/2010/main" val="3211164626"/>
       </p:ext>
     </p:extLst>
   </p:cSld>
@@ -16924,7 +16855,7 @@
           <a:blip r:embed="rId3" cstate="print">
             <a:extLst>
               <a:ext uri="{28A0092B-C50C-407E-A947-70E740481C1C}">
-                <a14:useLocalDpi xmlns:a14="http://schemas.microsoft.com/office/drawing/2010/main" xmlns="" val="0"/>
+                <a14:useLocalDpi xmlns="" xmlns:a14="http://schemas.microsoft.com/office/drawing/2010/main" val="0"/>
               </a:ext>
             </a:extLst>
           </a:blip>
@@ -16945,7 +16876,7 @@
     </p:spTree>
     <p:extLst>
       <p:ext uri="{BB962C8B-B14F-4D97-AF65-F5344CB8AC3E}">
-        <p14:creationId xmlns:p14="http://schemas.microsoft.com/office/powerpoint/2010/main" xmlns="" val="3124312875"/>
+        <p14:creationId xmlns="" xmlns:p14="http://schemas.microsoft.com/office/powerpoint/2010/main" val="3124312875"/>
       </p:ext>
     </p:extLst>
   </p:cSld>
@@ -16991,7 +16922,7 @@
           <a:blip r:embed="rId3" cstate="print">
             <a:extLst>
               <a:ext uri="{28A0092B-C50C-407E-A947-70E740481C1C}">
-                <a14:useLocalDpi xmlns:a14="http://schemas.microsoft.com/office/drawing/2010/main" xmlns="" val="0"/>
+                <a14:useLocalDpi xmlns="" xmlns:a14="http://schemas.microsoft.com/office/drawing/2010/main" val="0"/>
               </a:ext>
             </a:extLst>
           </a:blip>
@@ -17012,7 +16943,7 @@
     </p:spTree>
     <p:extLst>
       <p:ext uri="{BB962C8B-B14F-4D97-AF65-F5344CB8AC3E}">
-        <p14:creationId xmlns:p14="http://schemas.microsoft.com/office/powerpoint/2010/main" xmlns="" val="2921490114"/>
+        <p14:creationId xmlns="" xmlns:p14="http://schemas.microsoft.com/office/powerpoint/2010/main" val="2921490114"/>
       </p:ext>
     </p:extLst>
   </p:cSld>
@@ -17058,7 +16989,7 @@
           <a:blip r:embed="rId3" cstate="print">
             <a:extLst>
               <a:ext uri="{28A0092B-C50C-407E-A947-70E740481C1C}">
-                <a14:useLocalDpi xmlns:a14="http://schemas.microsoft.com/office/drawing/2010/main" xmlns="" val="0"/>
+                <a14:useLocalDpi xmlns="" xmlns:a14="http://schemas.microsoft.com/office/drawing/2010/main" val="0"/>
               </a:ext>
             </a:extLst>
           </a:blip>
@@ -17079,7 +17010,7 @@
     </p:spTree>
     <p:extLst>
       <p:ext uri="{BB962C8B-B14F-4D97-AF65-F5344CB8AC3E}">
-        <p14:creationId xmlns:p14="http://schemas.microsoft.com/office/powerpoint/2010/main" xmlns="" val="3042578824"/>
+        <p14:creationId xmlns="" xmlns:p14="http://schemas.microsoft.com/office/powerpoint/2010/main" val="3042578824"/>
       </p:ext>
     </p:extLst>
   </p:cSld>
@@ -17139,7 +17070,7 @@
     </p:spTree>
     <p:extLst>
       <p:ext uri="{BB962C8B-B14F-4D97-AF65-F5344CB8AC3E}">
-        <p14:creationId xmlns:p14="http://schemas.microsoft.com/office/powerpoint/2010/main" xmlns="" val="2409432381"/>
+        <p14:creationId xmlns="" xmlns:p14="http://schemas.microsoft.com/office/powerpoint/2010/main" val="2409432381"/>
       </p:ext>
     </p:extLst>
   </p:cSld>
@@ -17185,7 +17116,7 @@
           <a:blip r:embed="rId3" cstate="print">
             <a:extLst>
               <a:ext uri="{28A0092B-C50C-407E-A947-70E740481C1C}">
-                <a14:useLocalDpi xmlns:a14="http://schemas.microsoft.com/office/drawing/2010/main" xmlns="" val="0"/>
+                <a14:useLocalDpi xmlns="" xmlns:a14="http://schemas.microsoft.com/office/drawing/2010/main" val="0"/>
               </a:ext>
             </a:extLst>
           </a:blip>
@@ -17206,7 +17137,7 @@
     </p:spTree>
     <p:extLst>
       <p:ext uri="{BB962C8B-B14F-4D97-AF65-F5344CB8AC3E}">
-        <p14:creationId xmlns:p14="http://schemas.microsoft.com/office/powerpoint/2010/main" xmlns="" val="3544869878"/>
+        <p14:creationId xmlns="" xmlns:p14="http://schemas.microsoft.com/office/powerpoint/2010/main" val="3544869878"/>
       </p:ext>
     </p:extLst>
   </p:cSld>
@@ -17252,7 +17183,7 @@
           <a:blip r:embed="rId3" cstate="print">
             <a:extLst>
               <a:ext uri="{28A0092B-C50C-407E-A947-70E740481C1C}">
-                <a14:useLocalDpi xmlns:a14="http://schemas.microsoft.com/office/drawing/2010/main" xmlns="" val="0"/>
+                <a14:useLocalDpi xmlns="" xmlns:a14="http://schemas.microsoft.com/office/drawing/2010/main" val="0"/>
               </a:ext>
             </a:extLst>
           </a:blip>
@@ -17273,7 +17204,7 @@
     </p:spTree>
     <p:extLst>
       <p:ext uri="{BB962C8B-B14F-4D97-AF65-F5344CB8AC3E}">
-        <p14:creationId xmlns:p14="http://schemas.microsoft.com/office/powerpoint/2010/main" xmlns="" val="1848460001"/>
+        <p14:creationId xmlns="" xmlns:p14="http://schemas.microsoft.com/office/powerpoint/2010/main" val="1848460001"/>
       </p:ext>
     </p:extLst>
   </p:cSld>
@@ -17319,7 +17250,7 @@
           <a:blip r:embed="rId3" cstate="print">
             <a:extLst>
               <a:ext uri="{28A0092B-C50C-407E-A947-70E740481C1C}">
-                <a14:useLocalDpi xmlns:a14="http://schemas.microsoft.com/office/drawing/2010/main" xmlns="" val="0"/>
+                <a14:useLocalDpi xmlns="" xmlns:a14="http://schemas.microsoft.com/office/drawing/2010/main" val="0"/>
               </a:ext>
             </a:extLst>
           </a:blip>
@@ -17340,7 +17271,7 @@
     </p:spTree>
     <p:extLst>
       <p:ext uri="{BB962C8B-B14F-4D97-AF65-F5344CB8AC3E}">
-        <p14:creationId xmlns:p14="http://schemas.microsoft.com/office/powerpoint/2010/main" xmlns="" val="3552526594"/>
+        <p14:creationId xmlns="" xmlns:p14="http://schemas.microsoft.com/office/powerpoint/2010/main" val="3552526594"/>
       </p:ext>
     </p:extLst>
   </p:cSld>
@@ -17428,7 +17359,7 @@
     </p:spTree>
     <p:extLst>
       <p:ext uri="{BB962C8B-B14F-4D97-AF65-F5344CB8AC3E}">
-        <p14:creationId xmlns:p14="http://schemas.microsoft.com/office/powerpoint/2010/main" xmlns="" val="2898697771"/>
+        <p14:creationId xmlns="" xmlns:p14="http://schemas.microsoft.com/office/powerpoint/2010/main" val="2898697771"/>
       </p:ext>
     </p:extLst>
   </p:cSld>
@@ -17495,20 +17426,26 @@
             <p:ph idx="1"/>
           </p:nvPr>
         </p:nvSpPr>
-        <p:spPr/>
+        <p:spPr>
+          <a:xfrm>
+            <a:off x="685800" y="1600200"/>
+            <a:ext cx="7848600" cy="4495799"/>
+          </a:xfrm>
+        </p:spPr>
         <p:txBody>
           <a:bodyPr>
-            <a:normAutofit fontScale="92500" lnSpcReduction="20000"/>
+            <a:normAutofit/>
           </a:bodyPr>
           <a:lstStyle/>
           <a:p>
             <a:r>
+              <a:rPr lang="en-US" dirty="0" err="1" smtClean="0"/>
+              <a:t>ArcadeFire</a:t>
+            </a:r>
+            <a:r>
               <a:rPr lang="en-US" dirty="0" smtClean="0"/>
-              <a:t>Video</a:t>
-            </a:r>
-            <a:endParaRPr lang="en-US" dirty="0" smtClean="0">
-              <a:hlinkClick r:id="rId2"/>
-            </a:endParaRPr>
+              <a:t> Video</a:t>
+            </a:r>
           </a:p>
           <a:p>
             <a:pPr lvl="1"/>
@@ -17516,42 +17453,45 @@
               <a:rPr lang="en-US" dirty="0" smtClean="0">
                 <a:hlinkClick r:id="rId2"/>
               </a:rPr>
+              <a:t>http://thewildernessdowntown.com/</a:t>
+            </a:r>
+            <a:endParaRPr lang="en-US" dirty="0" smtClean="0"/>
+          </a:p>
+          <a:p>
+            <a:r>
+              <a:rPr lang="en-US" dirty="0" smtClean="0"/>
+              <a:t>Video</a:t>
+            </a:r>
+            <a:endParaRPr lang="en-US" dirty="0" smtClean="0">
+              <a:hlinkClick r:id="rId3"/>
+            </a:endParaRPr>
+          </a:p>
+          <a:p>
+            <a:pPr lvl="1"/>
+            <a:r>
+              <a:rPr lang="en-US" dirty="0" smtClean="0">
+                <a:hlinkClick r:id="rId3"/>
+              </a:rPr>
               <a:t>http</a:t>
             </a:r>
-            <a:r>
-              <a:rPr lang="en-US" dirty="0">
-                <a:hlinkClick r:id="rId2"/>
-              </a:rPr>
-              <a:t>://</a:t>
-            </a:r>
-            <a:r>
-              <a:rPr lang="en-US" dirty="0" smtClean="0">
-                <a:hlinkClick r:id="rId2"/>
-              </a:rPr>
-              <a:t>craftymind.com/factory/html5video/CanvasVideo.html</a:t>
-            </a:r>
-            <a:endParaRPr lang="en-US" dirty="0" smtClean="0"/>
-          </a:p>
-          <a:p>
-            <a:r>
-              <a:rPr lang="en-US" dirty="0" smtClean="0"/>
-              <a:t>Drag and Drop</a:t>
-            </a:r>
-          </a:p>
-          <a:p>
-            <a:pPr lvl="1"/>
             <a:r>
               <a:rPr lang="en-US" dirty="0">
                 <a:hlinkClick r:id="rId3"/>
               </a:rPr>
-              <a:t>http://slides.html5rocks.com/#slide13</a:t>
+              <a:t>://</a:t>
+            </a:r>
+            <a:r>
+              <a:rPr lang="en-US" dirty="0" smtClean="0">
+                <a:hlinkClick r:id="rId3"/>
+              </a:rPr>
+              <a:t>craftymind.com/factory/html5video/CanvasVideo.html</a:t>
             </a:r>
             <a:endParaRPr lang="en-US" dirty="0" smtClean="0"/>
           </a:p>
           <a:p>
             <a:r>
               <a:rPr lang="en-US" dirty="0" smtClean="0"/>
-              <a:t>Geo-location</a:t>
+              <a:t>Drag and Drop</a:t>
             </a:r>
           </a:p>
           <a:p>
@@ -17560,20 +17500,14 @@
               <a:rPr lang="en-US" dirty="0">
                 <a:hlinkClick r:id="rId4"/>
               </a:rPr>
-              <a:t>http://slides.html5rocks.com/#</a:t>
-            </a:r>
-            <a:r>
-              <a:rPr lang="en-US" dirty="0" smtClean="0">
-                <a:hlinkClick r:id="rId4"/>
-              </a:rPr>
-              <a:t>slide14</a:t>
+              <a:t>http://slides.html5rocks.com/#slide13</a:t>
             </a:r>
             <a:endParaRPr lang="en-US" dirty="0" smtClean="0"/>
           </a:p>
           <a:p>
             <a:r>
-              <a:rPr lang="en-US" dirty="0"/>
-              <a:t>New Form Fields</a:t>
+              <a:rPr lang="en-US" dirty="0" smtClean="0"/>
+              <a:t>Geo-location</a:t>
             </a:r>
           </a:p>
           <a:p>
@@ -17588,14 +17522,14 @@
               <a:rPr lang="en-US" dirty="0" smtClean="0">
                 <a:hlinkClick r:id="rId5"/>
               </a:rPr>
-              <a:t>slide21</a:t>
+              <a:t>slide14</a:t>
             </a:r>
             <a:endParaRPr lang="en-US" dirty="0" smtClean="0"/>
           </a:p>
           <a:p>
             <a:r>
-              <a:rPr lang="en-US" dirty="0" smtClean="0"/>
-              <a:t>Canvas</a:t>
+              <a:rPr lang="en-US" dirty="0"/>
+              <a:t>New Form Fields</a:t>
             </a:r>
           </a:p>
           <a:p>
@@ -17610,14 +17544,14 @@
               <a:rPr lang="en-US" dirty="0" smtClean="0">
                 <a:hlinkClick r:id="rId6"/>
               </a:rPr>
-              <a:t>slide24</a:t>
+              <a:t>slide21</a:t>
             </a:r>
             <a:endParaRPr lang="en-US" dirty="0" smtClean="0"/>
           </a:p>
           <a:p>
             <a:r>
               <a:rPr lang="en-US" dirty="0" smtClean="0"/>
-              <a:t>New CSS</a:t>
+              <a:t>Canvas</a:t>
             </a:r>
           </a:p>
           <a:p>
@@ -17626,7 +17560,13 @@
               <a:rPr lang="en-US" dirty="0">
                 <a:hlinkClick r:id="rId7"/>
               </a:rPr>
-              <a:t>http://slides.html5rocks.com/#slide32</a:t>
+              <a:t>http://slides.html5rocks.com/#</a:t>
+            </a:r>
+            <a:r>
+              <a:rPr lang="en-US" dirty="0" smtClean="0">
+                <a:hlinkClick r:id="rId7"/>
+              </a:rPr>
+              <a:t>slide24</a:t>
             </a:r>
             <a:endParaRPr lang="en-US" dirty="0" smtClean="0"/>
           </a:p>
@@ -17639,7 +17579,7 @@
     </p:spTree>
     <p:extLst>
       <p:ext uri="{BB962C8B-B14F-4D97-AF65-F5344CB8AC3E}">
-        <p14:creationId xmlns:p14="http://schemas.microsoft.com/office/powerpoint/2010/main" xmlns="" val="1317803592"/>
+        <p14:creationId xmlns="" xmlns:p14="http://schemas.microsoft.com/office/powerpoint/2010/main" val="1317803592"/>
       </p:ext>
     </p:extLst>
   </p:cSld>
@@ -17805,7 +17745,7 @@
     </p:spTree>
     <p:extLst>
       <p:ext uri="{BB962C8B-B14F-4D97-AF65-F5344CB8AC3E}">
-        <p14:creationId xmlns:p14="http://schemas.microsoft.com/office/powerpoint/2010/main" xmlns="" val="1199420989"/>
+        <p14:creationId xmlns="" xmlns:p14="http://schemas.microsoft.com/office/powerpoint/2010/main" val="1199420989"/>
       </p:ext>
     </p:extLst>
   </p:cSld>
@@ -17950,7 +17890,7 @@
     </p:spTree>
     <p:extLst>
       <p:ext uri="{BB962C8B-B14F-4D97-AF65-F5344CB8AC3E}">
-        <p14:creationId xmlns:p14="http://schemas.microsoft.com/office/powerpoint/2010/main" xmlns="" val="110130428"/>
+        <p14:creationId xmlns="" xmlns:p14="http://schemas.microsoft.com/office/powerpoint/2010/main" val="110130428"/>
       </p:ext>
     </p:extLst>
   </p:cSld>
@@ -18128,7 +18068,7 @@
     </p:spTree>
     <p:extLst>
       <p:ext uri="{BB962C8B-B14F-4D97-AF65-F5344CB8AC3E}">
-        <p14:creationId xmlns:p14="http://schemas.microsoft.com/office/powerpoint/2010/main" xmlns="" val="1760914082"/>
+        <p14:creationId xmlns="" xmlns:p14="http://schemas.microsoft.com/office/powerpoint/2010/main" val="1760914082"/>
       </p:ext>
     </p:extLst>
   </p:cSld>
@@ -18305,7 +18245,7 @@
     </p:spTree>
     <p:extLst>
       <p:ext uri="{BB962C8B-B14F-4D97-AF65-F5344CB8AC3E}">
-        <p14:creationId xmlns:p14="http://schemas.microsoft.com/office/powerpoint/2010/main" xmlns="" val="339382987"/>
+        <p14:creationId xmlns="" xmlns:p14="http://schemas.microsoft.com/office/powerpoint/2010/main" val="339382987"/>
       </p:ext>
     </p:extLst>
   </p:cSld>
@@ -18533,7 +18473,6 @@
               <a:rPr lang="en-US" dirty="0" smtClean="0"/>
               <a:t>AAC</a:t>
             </a:r>
-            <a:endParaRPr lang="en-US" dirty="0" smtClean="0"/>
           </a:p>
           <a:p>
             <a:r>
@@ -18666,11 +18605,7 @@
             <a:pPr lvl="1"/>
             <a:r>
               <a:rPr lang="en-US" dirty="0" smtClean="0"/>
-              <a:t>&lt;canvas id</a:t>
-            </a:r>
-            <a:r>
-              <a:rPr lang="en-US" dirty="0" smtClean="0"/>
-              <a:t>=“</a:t>
+              <a:t>&lt;canvas id=“</a:t>
             </a:r>
             <a:r>
               <a:rPr lang="en-US" dirty="0" err="1" smtClean="0"/>
@@ -18678,29 +18613,8 @@
             </a:r>
             <a:r>
               <a:rPr lang="en-US" dirty="0" smtClean="0"/>
-              <a:t>" </a:t>
-            </a:r>
-            <a:r>
-              <a:rPr lang="en-US" dirty="0" smtClean="0"/>
-              <a:t>width</a:t>
-            </a:r>
-            <a:r>
-              <a:rPr lang="en-US" dirty="0" smtClean="0"/>
-              <a:t>=“500 </a:t>
-            </a:r>
-            <a:r>
-              <a:rPr lang="en-US" dirty="0" smtClean="0"/>
-              <a:t>height</a:t>
-            </a:r>
-            <a:r>
-              <a:rPr lang="en-US" dirty="0" smtClean="0"/>
-              <a:t>=“500"&gt;&lt;/</a:t>
-            </a:r>
-            <a:r>
-              <a:rPr lang="en-US" dirty="0" smtClean="0"/>
-              <a:t>canvas&gt; </a:t>
-            </a:r>
-            <a:endParaRPr lang="en-US" dirty="0" smtClean="0"/>
+              <a:t>" width=“500 height=“500"&gt;&lt;/canvas&gt; </a:t>
+            </a:r>
           </a:p>
           <a:p>
             <a:pPr lvl="1"/>
@@ -18716,7 +18630,6 @@
               <a:rPr lang="en-US" dirty="0" smtClean="0"/>
               <a:t>"&gt; </a:t>
             </a:r>
-            <a:endParaRPr lang="en-US" dirty="0" smtClean="0"/>
           </a:p>
           <a:p>
             <a:pPr lvl="1"/>
@@ -18761,11 +18674,7 @@
             </a:r>
             <a:r>
               <a:rPr lang="en-US" dirty="0" smtClean="0"/>
-              <a:t> </a:t>
-            </a:r>
-            <a:r>
-              <a:rPr lang="en-US" dirty="0" smtClean="0"/>
-              <a:t>= </a:t>
+              <a:t> = </a:t>
             </a:r>
             <a:r>
               <a:rPr lang="en-US" dirty="0" err="1" smtClean="0"/>
@@ -18773,11 +18682,7 @@
             </a:r>
             <a:r>
               <a:rPr lang="en-US" dirty="0" smtClean="0"/>
-              <a:t>("2d</a:t>
-            </a:r>
-            <a:r>
-              <a:rPr lang="en-US" dirty="0" smtClean="0"/>
-              <a:t>");</a:t>
+              <a:t>("2d");</a:t>
             </a:r>
           </a:p>
           <a:p>
@@ -18788,11 +18693,7 @@
             </a:r>
             <a:r>
               <a:rPr lang="en-US" dirty="0" smtClean="0"/>
-              <a:t> = '20px sans-serif</a:t>
-            </a:r>
-            <a:r>
-              <a:rPr lang="en-US" dirty="0" smtClean="0"/>
-              <a:t>';</a:t>
+              <a:t> = '20px sans-serif';</a:t>
             </a:r>
           </a:p>
           <a:p>

</xml_diff>